<commit_message>
Updates to M2 and tables.
</commit_message>
<xml_diff>
--- a/M2_CellRanger_Alignment/M2_CellRanger.pptx
+++ b/M2_CellRanger_Alignment/M2_CellRanger.pptx
@@ -15,8 +15,8 @@
     <p:sldId id="261" r:id="rId6"/>
     <p:sldId id="262" r:id="rId7"/>
     <p:sldId id="263" r:id="rId8"/>
-    <p:sldId id="268" r:id="rId9"/>
-    <p:sldId id="265" r:id="rId10"/>
+    <p:sldId id="265" r:id="rId9"/>
+    <p:sldId id="268" r:id="rId10"/>
     <p:sldId id="266" r:id="rId11"/>
   </p:sldIdLst>
   <p:sldSz cx="12192000" cy="6858000"/>
@@ -206,7 +206,7 @@
           <a:p>
             <a:fld id="{FF40CFF0-3E11-4AF6-9747-7919C58FBC48}" type="datetimeFigureOut">
               <a:rPr lang="en-US" smtClean="0"/>
-              <a:t>1/4/24</a:t>
+              <a:t>1/5/2024</a:t>
             </a:fld>
             <a:endParaRPr lang="en-US"/>
           </a:p>
@@ -628,7 +628,7 @@
           <a:p>
             <a:fld id="{9F69634C-F75C-45F7-A87A-C5E2AF3ECA41}" type="datetimeFigureOut">
               <a:rPr lang="en-US" smtClean="0"/>
-              <a:t>1/4/24</a:t>
+              <a:t>1/5/2024</a:t>
             </a:fld>
             <a:endParaRPr lang="en-US"/>
           </a:p>
@@ -792,7 +792,7 @@
           <a:p>
             <a:fld id="{9F69634C-F75C-45F7-A87A-C5E2AF3ECA41}" type="datetimeFigureOut">
               <a:rPr lang="en-US" smtClean="0"/>
-              <a:t>1/4/24</a:t>
+              <a:t>1/5/2024</a:t>
             </a:fld>
             <a:endParaRPr lang="en-US"/>
           </a:p>
@@ -995,7 +995,7 @@
           <a:p>
             <a:fld id="{9F69634C-F75C-45F7-A87A-C5E2AF3ECA41}" type="datetimeFigureOut">
               <a:rPr lang="en-US" smtClean="0"/>
-              <a:t>1/4/24</a:t>
+              <a:t>1/5/2024</a:t>
             </a:fld>
             <a:endParaRPr lang="en-US"/>
           </a:p>
@@ -1260,7 +1260,7 @@
           <a:p>
             <a:fld id="{9F69634C-F75C-45F7-A87A-C5E2AF3ECA41}" type="datetimeFigureOut">
               <a:rPr lang="en-US" smtClean="0"/>
-              <a:t>1/4/24</a:t>
+              <a:t>1/5/2024</a:t>
             </a:fld>
             <a:endParaRPr lang="en-US"/>
           </a:p>
@@ -1373,7 +1373,7 @@
           <a:p>
             <a:fld id="{9F69634C-F75C-45F7-A87A-C5E2AF3ECA41}" type="datetimeFigureOut">
               <a:rPr lang="en-US" smtClean="0"/>
-              <a:t>1/4/24</a:t>
+              <a:t>1/5/2024</a:t>
             </a:fld>
             <a:endParaRPr lang="en-US"/>
           </a:p>
@@ -1614,7 +1614,7 @@
           <a:p>
             <a:fld id="{9F69634C-F75C-45F7-A87A-C5E2AF3ECA41}" type="datetimeFigureOut">
               <a:rPr lang="en-US" smtClean="0"/>
-              <a:t>1/4/24</a:t>
+              <a:t>1/5/2024</a:t>
             </a:fld>
             <a:endParaRPr lang="en-US"/>
           </a:p>
@@ -2636,7 +2636,7 @@
           <a:p>
             <a:r>
               <a:rPr lang="en-US" dirty="0"/>
-              <a:t>Convert Raw Single Cell RNA-Seq to Gene Expression</a:t>
+              <a:t>10X Data</a:t>
             </a:r>
           </a:p>
         </p:txBody>
@@ -2725,10 +2725,10 @@
       </p:sp>
       <p:pic>
         <p:nvPicPr>
-          <p:cNvPr id="1026" name="Picture 2">
+          <p:cNvPr id="3" name="Picture 2">
             <a:extLst>
               <a:ext uri="{FF2B5EF4-FFF2-40B4-BE49-F238E27FC236}">
-                <a16:creationId xmlns:a16="http://schemas.microsoft.com/office/drawing/2014/main" id="{EC6EC454-380C-18B3-E0F7-F3935D694B66}"/>
+                <a16:creationId xmlns:a16="http://schemas.microsoft.com/office/drawing/2014/main" id="{810CCC57-8FAE-0379-10C9-FCAB10C4B262}"/>
               </a:ext>
             </a:extLst>
           </p:cNvPr>
@@ -2752,7 +2752,7 @@
         </p:blipFill>
         <p:spPr bwMode="auto">
           <a:xfrm>
-            <a:off x="2674931" y="2256158"/>
+            <a:off x="4827581" y="2331711"/>
             <a:ext cx="4632385" cy="738286"/>
           </a:xfrm>
           <a:prstGeom prst="rect">
@@ -3848,8 +3848,8 @@
         </p:nvSpPr>
         <p:spPr>
           <a:xfrm>
-            <a:off x="9325" y="2164128"/>
-            <a:ext cx="3310759" cy="4693872"/>
+            <a:off x="9325" y="2133600"/>
+            <a:ext cx="3310759" cy="4724400"/>
           </a:xfrm>
           <a:prstGeom prst="rect">
             <a:avLst/>
@@ -3885,6 +3885,53 @@
           <a:p>
             <a:pPr algn="ctr"/>
             <a:endParaRPr lang="en-US"/>
+          </a:p>
+        </p:txBody>
+      </p:sp>
+      <p:sp>
+        <p:nvSpPr>
+          <p:cNvPr id="3" name="TextBox 2">
+            <a:extLst>
+              <a:ext uri="{FF2B5EF4-FFF2-40B4-BE49-F238E27FC236}">
+                <a16:creationId xmlns:a16="http://schemas.microsoft.com/office/drawing/2014/main" id="{ADE7FAA6-4993-D22B-8A02-C13A1079747F}"/>
+              </a:ext>
+            </a:extLst>
+          </p:cNvPr>
+          <p:cNvSpPr txBox="1"/>
+          <p:nvPr/>
+        </p:nvSpPr>
+        <p:spPr>
+          <a:xfrm>
+            <a:off x="4281980" y="1351290"/>
+            <a:ext cx="7181850" cy="2031325"/>
+          </a:xfrm>
+          <a:prstGeom prst="rect">
+            <a:avLst/>
+          </a:prstGeom>
+          <a:noFill/>
+        </p:spPr>
+        <p:txBody>
+          <a:bodyPr wrap="square" rtlCol="0">
+            <a:spAutoFit/>
+          </a:bodyPr>
+          <a:lstStyle/>
+          <a:p>
+            <a:r>
+              <a:rPr lang="en-US" dirty="0"/>
+              <a:t>Cell Ranger compares 10x barcodes to the whitelist file of known barcodes for a given assay</a:t>
+            </a:r>
+          </a:p>
+          <a:p>
+            <a:r>
+              <a:rPr lang="en-US" dirty="0"/>
+              <a:t>Barcodes that do not exactly match any whitelist entries are statistically tested if there is sufficient evidence that they have a sequencing error and are a match.</a:t>
+            </a:r>
+          </a:p>
+          <a:p>
+            <a:r>
+              <a:rPr lang="en-US" dirty="0"/>
+              <a:t>If so, bar code is corrected to closest matching entry and included, nonmatching barcodes are discarded.</a:t>
+            </a:r>
           </a:p>
         </p:txBody>
       </p:sp>
@@ -4606,6 +4653,354 @@
           </a:p>
         </p:txBody>
       </p:sp>
+      <p:pic>
+        <p:nvPicPr>
+          <p:cNvPr id="16" name="Picture 2">
+            <a:extLst>
+              <a:ext uri="{FF2B5EF4-FFF2-40B4-BE49-F238E27FC236}">
+                <a16:creationId xmlns:a16="http://schemas.microsoft.com/office/drawing/2014/main" id="{193E1370-9B7C-0BCF-2DE3-C03969729F0E}"/>
+              </a:ext>
+            </a:extLst>
+          </p:cNvPr>
+          <p:cNvPicPr>
+            <a:picLocks noChangeAspect="1" noChangeArrowheads="1"/>
+          </p:cNvPicPr>
+          <p:nvPr/>
+        </p:nvPicPr>
+        <p:blipFill>
+          <a:blip r:embed="rId3">
+            <a:extLst>
+              <a:ext uri="{28A0092B-C50C-407E-A947-70E740481C1C}">
+                <a14:useLocalDpi xmlns:a14="http://schemas.microsoft.com/office/drawing/2010/main" val="0"/>
+              </a:ext>
+            </a:extLst>
+          </a:blip>
+          <a:srcRect/>
+          <a:stretch>
+            <a:fillRect/>
+          </a:stretch>
+        </p:blipFill>
+        <p:spPr bwMode="auto">
+          <a:xfrm>
+            <a:off x="5611115" y="1802834"/>
+            <a:ext cx="6211951" cy="3433712"/>
+          </a:xfrm>
+          <a:prstGeom prst="rect">
+            <a:avLst/>
+          </a:prstGeom>
+          <a:noFill/>
+          <a:extLst>
+            <a:ext uri="{909E8E84-426E-40DD-AFC4-6F175D3DCCD1}">
+              <a14:hiddenFill xmlns:a14="http://schemas.microsoft.com/office/drawing/2010/main">
+                <a:solidFill>
+                  <a:srgbClr val="FFFFFF"/>
+                </a:solidFill>
+              </a14:hiddenFill>
+            </a:ext>
+          </a:extLst>
+        </p:spPr>
+      </p:pic>
+      <p:sp>
+        <p:nvSpPr>
+          <p:cNvPr id="17" name="TextBox 16">
+            <a:extLst>
+              <a:ext uri="{FF2B5EF4-FFF2-40B4-BE49-F238E27FC236}">
+                <a16:creationId xmlns:a16="http://schemas.microsoft.com/office/drawing/2014/main" id="{76AE6B95-074D-2045-CB5C-574CDF38B60F}"/>
+              </a:ext>
+            </a:extLst>
+          </p:cNvPr>
+          <p:cNvSpPr txBox="1"/>
+          <p:nvPr/>
+        </p:nvSpPr>
+        <p:spPr>
+          <a:xfrm>
+            <a:off x="4257675" y="1003841"/>
+            <a:ext cx="7382577" cy="646331"/>
+          </a:xfrm>
+          <a:prstGeom prst="rect">
+            <a:avLst/>
+          </a:prstGeom>
+          <a:noFill/>
+        </p:spPr>
+        <p:txBody>
+          <a:bodyPr wrap="square" rtlCol="0">
+            <a:spAutoFit/>
+          </a:bodyPr>
+          <a:lstStyle/>
+          <a:p>
+            <a:r>
+              <a:rPr lang="en-US" dirty="0"/>
+              <a:t>Cell Ranger uses the STAR aligner, which perform splicing-aware alignment of reads to the genome.</a:t>
+            </a:r>
+          </a:p>
+        </p:txBody>
+      </p:sp>
+      <p:sp>
+        <p:nvSpPr>
+          <p:cNvPr id="18" name="TextBox 17">
+            <a:extLst>
+              <a:ext uri="{FF2B5EF4-FFF2-40B4-BE49-F238E27FC236}">
+                <a16:creationId xmlns:a16="http://schemas.microsoft.com/office/drawing/2014/main" id="{CC166B34-CD61-EFB0-EDA3-B357B8F8B082}"/>
+              </a:ext>
+            </a:extLst>
+          </p:cNvPr>
+          <p:cNvSpPr txBox="1"/>
+          <p:nvPr/>
+        </p:nvSpPr>
+        <p:spPr>
+          <a:xfrm>
+            <a:off x="4070309" y="2123018"/>
+            <a:ext cx="956929" cy="523220"/>
+          </a:xfrm>
+          <a:prstGeom prst="rect">
+            <a:avLst/>
+          </a:prstGeom>
+          <a:noFill/>
+        </p:spPr>
+        <p:txBody>
+          <a:bodyPr wrap="none" rtlCol="0">
+            <a:spAutoFit/>
+          </a:bodyPr>
+          <a:lstStyle/>
+          <a:p>
+            <a:r>
+              <a:rPr lang="en-US" sz="1400" dirty="0"/>
+              <a:t>Reference </a:t>
+            </a:r>
+          </a:p>
+          <a:p>
+            <a:r>
+              <a:rPr lang="en-US" sz="1400" dirty="0"/>
+              <a:t>Genome</a:t>
+            </a:r>
+          </a:p>
+        </p:txBody>
+      </p:sp>
+      <p:sp>
+        <p:nvSpPr>
+          <p:cNvPr id="19" name="TextBox 18">
+            <a:extLst>
+              <a:ext uri="{FF2B5EF4-FFF2-40B4-BE49-F238E27FC236}">
+                <a16:creationId xmlns:a16="http://schemas.microsoft.com/office/drawing/2014/main" id="{293F65D4-F7ED-4750-F775-987D03953C03}"/>
+              </a:ext>
+            </a:extLst>
+          </p:cNvPr>
+          <p:cNvSpPr txBox="1"/>
+          <p:nvPr/>
+        </p:nvSpPr>
+        <p:spPr>
+          <a:xfrm>
+            <a:off x="4070309" y="3695136"/>
+            <a:ext cx="1066254" cy="523220"/>
+          </a:xfrm>
+          <a:prstGeom prst="rect">
+            <a:avLst/>
+          </a:prstGeom>
+          <a:noFill/>
+        </p:spPr>
+        <p:txBody>
+          <a:bodyPr wrap="none" rtlCol="0">
+            <a:spAutoFit/>
+          </a:bodyPr>
+          <a:lstStyle/>
+          <a:p>
+            <a:r>
+              <a:rPr lang="en-US" sz="1400" dirty="0"/>
+              <a:t>Experiment </a:t>
+            </a:r>
+          </a:p>
+          <a:p>
+            <a:r>
+              <a:rPr lang="en-US" sz="1400" dirty="0"/>
+              <a:t>Reads</a:t>
+            </a:r>
+          </a:p>
+        </p:txBody>
+      </p:sp>
+      <p:sp>
+        <p:nvSpPr>
+          <p:cNvPr id="20" name="Left Brace 19">
+            <a:extLst>
+              <a:ext uri="{FF2B5EF4-FFF2-40B4-BE49-F238E27FC236}">
+                <a16:creationId xmlns:a16="http://schemas.microsoft.com/office/drawing/2014/main" id="{4BBF717F-9E79-0325-ECD3-2389F1C19F48}"/>
+              </a:ext>
+            </a:extLst>
+          </p:cNvPr>
+          <p:cNvSpPr/>
+          <p:nvPr/>
+        </p:nvSpPr>
+        <p:spPr>
+          <a:xfrm>
+            <a:off x="5175339" y="1996374"/>
+            <a:ext cx="253911" cy="779837"/>
+          </a:xfrm>
+          <a:prstGeom prst="leftBrace">
+            <a:avLst/>
+          </a:prstGeom>
+          <a:ln>
+            <a:solidFill>
+              <a:schemeClr val="tx1"/>
+            </a:solidFill>
+          </a:ln>
+        </p:spPr>
+        <p:style>
+          <a:lnRef idx="1">
+            <a:schemeClr val="accent1"/>
+          </a:lnRef>
+          <a:fillRef idx="0">
+            <a:schemeClr val="accent1"/>
+          </a:fillRef>
+          <a:effectRef idx="0">
+            <a:schemeClr val="accent1"/>
+          </a:effectRef>
+          <a:fontRef idx="minor">
+            <a:schemeClr val="tx1"/>
+          </a:fontRef>
+        </p:style>
+        <p:txBody>
+          <a:bodyPr rtlCol="0" anchor="ctr"/>
+          <a:lstStyle/>
+          <a:p>
+            <a:pPr algn="ctr"/>
+            <a:endParaRPr lang="en-US"/>
+          </a:p>
+        </p:txBody>
+      </p:sp>
+      <p:sp>
+        <p:nvSpPr>
+          <p:cNvPr id="21" name="Left Brace 20">
+            <a:extLst>
+              <a:ext uri="{FF2B5EF4-FFF2-40B4-BE49-F238E27FC236}">
+                <a16:creationId xmlns:a16="http://schemas.microsoft.com/office/drawing/2014/main" id="{4EB4A0E4-0BE7-9E88-3973-DE3DDEA920DA}"/>
+              </a:ext>
+            </a:extLst>
+          </p:cNvPr>
+          <p:cNvSpPr/>
+          <p:nvPr/>
+        </p:nvSpPr>
+        <p:spPr>
+          <a:xfrm>
+            <a:off x="5182067" y="2903982"/>
+            <a:ext cx="253911" cy="2172843"/>
+          </a:xfrm>
+          <a:prstGeom prst="leftBrace">
+            <a:avLst/>
+          </a:prstGeom>
+          <a:ln>
+            <a:solidFill>
+              <a:schemeClr val="tx1"/>
+            </a:solidFill>
+          </a:ln>
+        </p:spPr>
+        <p:style>
+          <a:lnRef idx="1">
+            <a:schemeClr val="accent1"/>
+          </a:lnRef>
+          <a:fillRef idx="0">
+            <a:schemeClr val="accent1"/>
+          </a:fillRef>
+          <a:effectRef idx="0">
+            <a:schemeClr val="accent1"/>
+          </a:effectRef>
+          <a:fontRef idx="minor">
+            <a:schemeClr val="tx1"/>
+          </a:fontRef>
+        </p:style>
+        <p:txBody>
+          <a:bodyPr rtlCol="0" anchor="ctr"/>
+          <a:lstStyle/>
+          <a:p>
+            <a:pPr algn="ctr"/>
+            <a:endParaRPr lang="en-US"/>
+          </a:p>
+        </p:txBody>
+      </p:sp>
+      <p:sp>
+        <p:nvSpPr>
+          <p:cNvPr id="22" name="TextBox 21">
+            <a:extLst>
+              <a:ext uri="{FF2B5EF4-FFF2-40B4-BE49-F238E27FC236}">
+                <a16:creationId xmlns:a16="http://schemas.microsoft.com/office/drawing/2014/main" id="{9FA9B2A2-D956-D993-145A-E3F886011E1C}"/>
+              </a:ext>
+            </a:extLst>
+          </p:cNvPr>
+          <p:cNvSpPr txBox="1"/>
+          <p:nvPr/>
+        </p:nvSpPr>
+        <p:spPr>
+          <a:xfrm>
+            <a:off x="4407093" y="5366331"/>
+            <a:ext cx="5911555" cy="307777"/>
+          </a:xfrm>
+          <a:prstGeom prst="rect">
+            <a:avLst/>
+          </a:prstGeom>
+          <a:noFill/>
+        </p:spPr>
+        <p:txBody>
+          <a:bodyPr wrap="none" rtlCol="0">
+            <a:spAutoFit/>
+          </a:bodyPr>
+          <a:lstStyle/>
+          <a:p>
+            <a:r>
+              <a:rPr lang="en-US" sz="1400" dirty="0">
+                <a:solidFill>
+                  <a:srgbClr val="6B4099"/>
+                </a:solidFill>
+              </a:rPr>
+              <a:t>Antisense reads </a:t>
+            </a:r>
+            <a:r>
+              <a:rPr lang="en-US" sz="1400" dirty="0"/>
+              <a:t>are discarded because they are not part of the transcriptome. </a:t>
+            </a:r>
+          </a:p>
+        </p:txBody>
+      </p:sp>
+      <p:sp>
+        <p:nvSpPr>
+          <p:cNvPr id="23" name="TextBox 22">
+            <a:extLst>
+              <a:ext uri="{FF2B5EF4-FFF2-40B4-BE49-F238E27FC236}">
+                <a16:creationId xmlns:a16="http://schemas.microsoft.com/office/drawing/2014/main" id="{0AFFC733-8DC7-77BD-45EE-625515DFB547}"/>
+              </a:ext>
+            </a:extLst>
+          </p:cNvPr>
+          <p:cNvSpPr txBox="1"/>
+          <p:nvPr/>
+        </p:nvSpPr>
+        <p:spPr>
+          <a:xfrm>
+            <a:off x="4407093" y="5729599"/>
+            <a:ext cx="5754460" cy="307777"/>
+          </a:xfrm>
+          <a:prstGeom prst="rect">
+            <a:avLst/>
+          </a:prstGeom>
+          <a:noFill/>
+        </p:spPr>
+        <p:txBody>
+          <a:bodyPr wrap="none" rtlCol="0">
+            <a:spAutoFit/>
+          </a:bodyPr>
+          <a:lstStyle/>
+          <a:p>
+            <a:r>
+              <a:rPr lang="en-US" sz="1400" dirty="0">
+                <a:solidFill>
+                  <a:srgbClr val="E84A50"/>
+                </a:solidFill>
+              </a:rPr>
+              <a:t>Intronic reads </a:t>
+            </a:r>
+            <a:r>
+              <a:rPr lang="en-US" sz="1400" dirty="0"/>
+              <a:t>can also be discarded for basic gene expression investigations.</a:t>
+            </a:r>
+          </a:p>
+        </p:txBody>
+      </p:sp>
     </p:spTree>
     <p:extLst>
       <p:ext uri="{BB962C8B-B14F-4D97-AF65-F5344CB8AC3E}">
@@ -4802,7 +5197,7 @@
         </p:nvSpPr>
         <p:spPr>
           <a:xfrm>
-            <a:off x="4729655" y="6627168"/>
+            <a:off x="4767755" y="6416940"/>
             <a:ext cx="5155323" cy="230832"/>
           </a:xfrm>
           <a:prstGeom prst="rect">
@@ -5370,6 +5765,305 @@
           </a:p>
         </p:txBody>
       </p:sp>
+      <p:sp>
+        <p:nvSpPr>
+          <p:cNvPr id="16" name="TextBox 15">
+            <a:extLst>
+              <a:ext uri="{FF2B5EF4-FFF2-40B4-BE49-F238E27FC236}">
+                <a16:creationId xmlns:a16="http://schemas.microsoft.com/office/drawing/2014/main" id="{B2658F92-AAF9-1B74-B0D5-E1983813DBA6}"/>
+              </a:ext>
+            </a:extLst>
+          </p:cNvPr>
+          <p:cNvSpPr txBox="1"/>
+          <p:nvPr/>
+        </p:nvSpPr>
+        <p:spPr>
+          <a:xfrm>
+            <a:off x="3862507" y="2559824"/>
+            <a:ext cx="5094516" cy="1754326"/>
+          </a:xfrm>
+          <a:prstGeom prst="rect">
+            <a:avLst/>
+          </a:prstGeom>
+          <a:noFill/>
+        </p:spPr>
+        <p:txBody>
+          <a:bodyPr wrap="square" rtlCol="0">
+            <a:spAutoFit/>
+          </a:bodyPr>
+          <a:lstStyle/>
+          <a:p>
+            <a:r>
+              <a:rPr lang="en-US" b="1" dirty="0"/>
+              <a:t>Homopolymer reads </a:t>
+            </a:r>
+            <a:r>
+              <a:rPr lang="en-US" dirty="0"/>
+              <a:t>(2+ repeat bases): known to be sources of error for DNA sequencing because it’s difficult to distinguish number of repeats beyond 2 (leads to alignment errors for the rest of reads.</a:t>
+            </a:r>
+          </a:p>
+          <a:p>
+            <a:r>
+              <a:rPr lang="en-US" dirty="0"/>
+              <a:t>     ~1.43 million homopolymer regions in human genome</a:t>
+            </a:r>
+          </a:p>
+        </p:txBody>
+      </p:sp>
+      <p:pic>
+        <p:nvPicPr>
+          <p:cNvPr id="3074" name="Picture 2">
+            <a:extLst>
+              <a:ext uri="{FF2B5EF4-FFF2-40B4-BE49-F238E27FC236}">
+                <a16:creationId xmlns:a16="http://schemas.microsoft.com/office/drawing/2014/main" id="{649ABEFF-EC2F-FEAE-55D7-98923A2E736F}"/>
+              </a:ext>
+            </a:extLst>
+          </p:cNvPr>
+          <p:cNvPicPr>
+            <a:picLocks noChangeAspect="1" noChangeArrowheads="1"/>
+          </p:cNvPicPr>
+          <p:nvPr/>
+        </p:nvPicPr>
+        <p:blipFill>
+          <a:blip r:embed="rId3">
+            <a:extLst>
+              <a:ext uri="{28A0092B-C50C-407E-A947-70E740481C1C}">
+                <a14:useLocalDpi xmlns:a14="http://schemas.microsoft.com/office/drawing/2010/main" val="0"/>
+              </a:ext>
+            </a:extLst>
+          </a:blip>
+          <a:srcRect/>
+          <a:stretch>
+            <a:fillRect/>
+          </a:stretch>
+        </p:blipFill>
+        <p:spPr bwMode="auto">
+          <a:xfrm>
+            <a:off x="9014173" y="2580609"/>
+            <a:ext cx="3070172" cy="1322920"/>
+          </a:xfrm>
+          <a:prstGeom prst="rect">
+            <a:avLst/>
+          </a:prstGeom>
+          <a:noFill/>
+          <a:extLst>
+            <a:ext uri="{909E8E84-426E-40DD-AFC4-6F175D3DCCD1}">
+              <a14:hiddenFill xmlns:a14="http://schemas.microsoft.com/office/drawing/2010/main">
+                <a:solidFill>
+                  <a:srgbClr val="FFFFFF"/>
+                </a:solidFill>
+              </a14:hiddenFill>
+            </a:ext>
+          </a:extLst>
+        </p:spPr>
+      </p:pic>
+      <p:sp>
+        <p:nvSpPr>
+          <p:cNvPr id="21" name="TextBox 20">
+            <a:extLst>
+              <a:ext uri="{FF2B5EF4-FFF2-40B4-BE49-F238E27FC236}">
+                <a16:creationId xmlns:a16="http://schemas.microsoft.com/office/drawing/2014/main" id="{FB5F0265-5EAA-B3D1-5F0B-1B1AC0458C2C}"/>
+              </a:ext>
+            </a:extLst>
+          </p:cNvPr>
+          <p:cNvSpPr txBox="1"/>
+          <p:nvPr/>
+        </p:nvSpPr>
+        <p:spPr>
+          <a:xfrm>
+            <a:off x="4486275" y="1023208"/>
+            <a:ext cx="6191250" cy="1200329"/>
+          </a:xfrm>
+          <a:prstGeom prst="rect">
+            <a:avLst/>
+          </a:prstGeom>
+          <a:noFill/>
+        </p:spPr>
+        <p:txBody>
+          <a:bodyPr wrap="square">
+            <a:spAutoFit/>
+          </a:bodyPr>
+          <a:lstStyle/>
+          <a:p>
+            <a:r>
+              <a:rPr lang="en-US" b="0" i="0" dirty="0">
+                <a:solidFill>
+                  <a:srgbClr val="333333"/>
+                </a:solidFill>
+                <a:effectLst/>
+                <a:latin typeface="Open Sans" panose="020B0606030504020204" pitchFamily="34" charset="0"/>
+              </a:rPr>
+              <a:t>Cell Ranger Criteria for Including Reads:</a:t>
+            </a:r>
+          </a:p>
+          <a:p>
+            <a:pPr>
+              <a:buFont typeface="Arial" panose="020B0604020202020204" pitchFamily="34" charset="0"/>
+              <a:buChar char="•"/>
+            </a:pPr>
+            <a:r>
+              <a:rPr lang="en-US" b="0" i="0" dirty="0">
+                <a:solidFill>
+                  <a:srgbClr val="333333"/>
+                </a:solidFill>
+                <a:effectLst/>
+                <a:latin typeface="Open Sans" panose="020B0606030504020204" pitchFamily="34" charset="0"/>
+              </a:rPr>
+              <a:t> Must not be a </a:t>
+            </a:r>
+            <a:r>
+              <a:rPr lang="en-US" b="1" i="0" dirty="0">
+                <a:solidFill>
+                  <a:srgbClr val="333333"/>
+                </a:solidFill>
+                <a:effectLst/>
+                <a:latin typeface="Open Sans" panose="020B0606030504020204" pitchFamily="34" charset="0"/>
+              </a:rPr>
+              <a:t>homopolymer</a:t>
+            </a:r>
+            <a:r>
+              <a:rPr lang="en-US" b="0" i="0" dirty="0">
+                <a:solidFill>
+                  <a:srgbClr val="333333"/>
+                </a:solidFill>
+                <a:effectLst/>
+                <a:latin typeface="Open Sans" panose="020B0606030504020204" pitchFamily="34" charset="0"/>
+              </a:rPr>
+              <a:t>, e.g. AAAAAAAAAA</a:t>
+            </a:r>
+          </a:p>
+          <a:p>
+            <a:pPr algn="l">
+              <a:buFont typeface="Arial" panose="020B0604020202020204" pitchFamily="34" charset="0"/>
+              <a:buChar char="•"/>
+            </a:pPr>
+            <a:r>
+              <a:rPr lang="en-US" b="0" i="0" dirty="0">
+                <a:solidFill>
+                  <a:srgbClr val="333333"/>
+                </a:solidFill>
+                <a:effectLst/>
+                <a:latin typeface="Open Sans" panose="020B0606030504020204" pitchFamily="34" charset="0"/>
+              </a:rPr>
+              <a:t> Must not contain </a:t>
+            </a:r>
+            <a:r>
+              <a:rPr lang="en-US" b="1" i="0" dirty="0">
+                <a:solidFill>
+                  <a:srgbClr val="333333"/>
+                </a:solidFill>
+                <a:effectLst/>
+                <a:latin typeface="Open Sans" panose="020B0606030504020204" pitchFamily="34" charset="0"/>
+              </a:rPr>
+              <a:t>N</a:t>
+            </a:r>
+          </a:p>
+          <a:p>
+            <a:pPr algn="l">
+              <a:buFont typeface="Arial" panose="020B0604020202020204" pitchFamily="34" charset="0"/>
+              <a:buChar char="•"/>
+            </a:pPr>
+            <a:r>
+              <a:rPr lang="en-US" b="0" i="0" dirty="0">
+                <a:solidFill>
+                  <a:srgbClr val="333333"/>
+                </a:solidFill>
+                <a:effectLst/>
+                <a:latin typeface="Open Sans" panose="020B0606030504020204" pitchFamily="34" charset="0"/>
+              </a:rPr>
+              <a:t> Must not contain bases with base </a:t>
+            </a:r>
+            <a:r>
+              <a:rPr lang="en-US" b="1" i="0" dirty="0">
+                <a:solidFill>
+                  <a:srgbClr val="333333"/>
+                </a:solidFill>
+                <a:effectLst/>
+                <a:latin typeface="Open Sans" panose="020B0606030504020204" pitchFamily="34" charset="0"/>
+              </a:rPr>
+              <a:t>quality &lt; 10</a:t>
+            </a:r>
+          </a:p>
+        </p:txBody>
+      </p:sp>
+      <p:sp>
+        <p:nvSpPr>
+          <p:cNvPr id="22" name="TextBox 21">
+            <a:extLst>
+              <a:ext uri="{FF2B5EF4-FFF2-40B4-BE49-F238E27FC236}">
+                <a16:creationId xmlns:a16="http://schemas.microsoft.com/office/drawing/2014/main" id="{D63B4C88-ECA9-290C-B7D3-7C46F1AE69F8}"/>
+              </a:ext>
+            </a:extLst>
+          </p:cNvPr>
+          <p:cNvSpPr txBox="1"/>
+          <p:nvPr/>
+        </p:nvSpPr>
+        <p:spPr>
+          <a:xfrm>
+            <a:off x="4391025" y="4729946"/>
+            <a:ext cx="6762750" cy="646331"/>
+          </a:xfrm>
+          <a:prstGeom prst="rect">
+            <a:avLst/>
+          </a:prstGeom>
+          <a:noFill/>
+        </p:spPr>
+        <p:txBody>
+          <a:bodyPr wrap="square" rtlCol="0">
+            <a:spAutoFit/>
+          </a:bodyPr>
+          <a:lstStyle/>
+          <a:p>
+            <a:r>
+              <a:rPr lang="en-US" dirty="0"/>
+              <a:t>Reads with N and base quality score &lt;10 are also discarded because of higher error rates. </a:t>
+            </a:r>
+          </a:p>
+        </p:txBody>
+      </p:sp>
+      <p:sp>
+        <p:nvSpPr>
+          <p:cNvPr id="24" name="TextBox 23">
+            <a:extLst>
+              <a:ext uri="{FF2B5EF4-FFF2-40B4-BE49-F238E27FC236}">
+                <a16:creationId xmlns:a16="http://schemas.microsoft.com/office/drawing/2014/main" id="{685B3D2D-3CA4-91D3-4496-28694B94D11A}"/>
+              </a:ext>
+            </a:extLst>
+          </p:cNvPr>
+          <p:cNvSpPr txBox="1"/>
+          <p:nvPr/>
+        </p:nvSpPr>
+        <p:spPr>
+          <a:xfrm>
+            <a:off x="4667250" y="6584468"/>
+            <a:ext cx="4922453" cy="230832"/>
+          </a:xfrm>
+          <a:prstGeom prst="rect">
+            <a:avLst/>
+          </a:prstGeom>
+          <a:noFill/>
+        </p:spPr>
+        <p:txBody>
+          <a:bodyPr wrap="square">
+            <a:spAutoFit/>
+          </a:bodyPr>
+          <a:lstStyle/>
+          <a:p>
+            <a:pPr algn="r"/>
+            <a:r>
+              <a:rPr lang="en-US" sz="900" i="1" dirty="0">
+                <a:solidFill>
+                  <a:schemeClr val="tx1">
+                    <a:lumMod val="50000"/>
+                    <a:lumOff val="50000"/>
+                  </a:schemeClr>
+                </a:solidFill>
+              </a:rPr>
+              <a:t>https://hackbrightacademy.com/blog/indel-finder-how-the-python-version-of-this-program-works/</a:t>
+            </a:r>
+          </a:p>
+        </p:txBody>
+      </p:sp>
     </p:spTree>
     <p:extLst>
       <p:ext uri="{BB962C8B-B14F-4D97-AF65-F5344CB8AC3E}">
@@ -6293,6 +6987,491 @@
           <p:cNvPr id="2" name="Title 1">
             <a:extLst>
               <a:ext uri="{FF2B5EF4-FFF2-40B4-BE49-F238E27FC236}">
+                <a16:creationId xmlns:a16="http://schemas.microsoft.com/office/drawing/2014/main" id="{15FF008D-6109-C04B-2DD5-F18725394719}"/>
+              </a:ext>
+            </a:extLst>
+          </p:cNvPr>
+          <p:cNvSpPr>
+            <a:spLocks noGrp="1"/>
+          </p:cNvSpPr>
+          <p:nvPr>
+            <p:ph type="title"/>
+          </p:nvPr>
+        </p:nvSpPr>
+        <p:spPr/>
+        <p:txBody>
+          <a:bodyPr/>
+          <a:lstStyle/>
+          <a:p>
+            <a:r>
+              <a:rPr lang="en-US" dirty="0"/>
+              <a:t>Cell Ranger Setup and Script</a:t>
+            </a:r>
+          </a:p>
+        </p:txBody>
+      </p:sp>
+      <p:sp>
+        <p:nvSpPr>
+          <p:cNvPr id="4" name="TextBox 3">
+            <a:extLst>
+              <a:ext uri="{FF2B5EF4-FFF2-40B4-BE49-F238E27FC236}">
+                <a16:creationId xmlns:a16="http://schemas.microsoft.com/office/drawing/2014/main" id="{CC1F8028-DD48-21C8-784C-0351ADD5D02F}"/>
+              </a:ext>
+            </a:extLst>
+          </p:cNvPr>
+          <p:cNvSpPr txBox="1"/>
+          <p:nvPr/>
+        </p:nvSpPr>
+        <p:spPr>
+          <a:xfrm>
+            <a:off x="4729655" y="6627168"/>
+            <a:ext cx="5155323" cy="230832"/>
+          </a:xfrm>
+          <a:prstGeom prst="rect">
+            <a:avLst/>
+          </a:prstGeom>
+          <a:noFill/>
+        </p:spPr>
+        <p:txBody>
+          <a:bodyPr wrap="square">
+            <a:spAutoFit/>
+          </a:bodyPr>
+          <a:lstStyle/>
+          <a:p>
+            <a:pPr algn="r"/>
+            <a:r>
+              <a:rPr lang="en-US" sz="900" i="1" dirty="0">
+                <a:solidFill>
+                  <a:schemeClr val="bg1">
+                    <a:lumMod val="50000"/>
+                  </a:schemeClr>
+                </a:solidFill>
+              </a:rPr>
+              <a:t>https://www.10xgenomics.com/support/software/cell-ranger/algorithms-overview/</a:t>
+            </a:r>
+            <a:r>
+              <a:rPr lang="en-US" sz="900" i="1" dirty="0" err="1">
+                <a:solidFill>
+                  <a:schemeClr val="bg1">
+                    <a:lumMod val="50000"/>
+                  </a:schemeClr>
+                </a:solidFill>
+              </a:rPr>
+              <a:t>cr</a:t>
+            </a:r>
+            <a:r>
+              <a:rPr lang="en-US" sz="900" i="1" dirty="0">
+                <a:solidFill>
+                  <a:schemeClr val="bg1">
+                    <a:lumMod val="50000"/>
+                  </a:schemeClr>
+                </a:solidFill>
+              </a:rPr>
+              <a:t>-</a:t>
+            </a:r>
+            <a:r>
+              <a:rPr lang="en-US" sz="900" i="1" dirty="0" err="1">
+                <a:solidFill>
+                  <a:schemeClr val="bg1">
+                    <a:lumMod val="50000"/>
+                  </a:schemeClr>
+                </a:solidFill>
+              </a:rPr>
+              <a:t>gex</a:t>
+            </a:r>
+            <a:r>
+              <a:rPr lang="en-US" sz="900" i="1" dirty="0">
+                <a:solidFill>
+                  <a:schemeClr val="bg1">
+                    <a:lumMod val="50000"/>
+                  </a:schemeClr>
+                </a:solidFill>
+              </a:rPr>
+              <a:t>-algorithm</a:t>
+            </a:r>
+          </a:p>
+        </p:txBody>
+      </p:sp>
+      <p:pic>
+        <p:nvPicPr>
+          <p:cNvPr id="9" name="Picture 8">
+            <a:extLst>
+              <a:ext uri="{FF2B5EF4-FFF2-40B4-BE49-F238E27FC236}">
+                <a16:creationId xmlns:a16="http://schemas.microsoft.com/office/drawing/2014/main" id="{AD1207BB-9632-1571-EEF5-3E724D672037}"/>
+              </a:ext>
+            </a:extLst>
+          </p:cNvPr>
+          <p:cNvPicPr>
+            <a:picLocks noChangeAspect="1"/>
+          </p:cNvPicPr>
+          <p:nvPr/>
+        </p:nvPicPr>
+        <p:blipFill>
+          <a:blip r:embed="rId2"/>
+          <a:stretch>
+            <a:fillRect/>
+          </a:stretch>
+        </p:blipFill>
+        <p:spPr>
+          <a:xfrm>
+            <a:off x="223236" y="3155486"/>
+            <a:ext cx="5382376" cy="466790"/>
+          </a:xfrm>
+          <a:prstGeom prst="rect">
+            <a:avLst/>
+          </a:prstGeom>
+        </p:spPr>
+      </p:pic>
+      <p:pic>
+        <p:nvPicPr>
+          <p:cNvPr id="11" name="Picture 10">
+            <a:extLst>
+              <a:ext uri="{FF2B5EF4-FFF2-40B4-BE49-F238E27FC236}">
+                <a16:creationId xmlns:a16="http://schemas.microsoft.com/office/drawing/2014/main" id="{7BAF6576-6704-37D3-63D6-CA58A5534A18}"/>
+              </a:ext>
+            </a:extLst>
+          </p:cNvPr>
+          <p:cNvPicPr>
+            <a:picLocks noChangeAspect="1"/>
+          </p:cNvPicPr>
+          <p:nvPr/>
+        </p:nvPicPr>
+        <p:blipFill>
+          <a:blip r:embed="rId3"/>
+          <a:stretch>
+            <a:fillRect/>
+          </a:stretch>
+        </p:blipFill>
+        <p:spPr>
+          <a:xfrm>
+            <a:off x="223236" y="2072615"/>
+            <a:ext cx="4001058" cy="438211"/>
+          </a:xfrm>
+          <a:prstGeom prst="rect">
+            <a:avLst/>
+          </a:prstGeom>
+        </p:spPr>
+      </p:pic>
+      <p:pic>
+        <p:nvPicPr>
+          <p:cNvPr id="13" name="Picture 12">
+            <a:extLst>
+              <a:ext uri="{FF2B5EF4-FFF2-40B4-BE49-F238E27FC236}">
+                <a16:creationId xmlns:a16="http://schemas.microsoft.com/office/drawing/2014/main" id="{8E7AE1C7-515B-E59C-E200-48350423EB9E}"/>
+              </a:ext>
+            </a:extLst>
+          </p:cNvPr>
+          <p:cNvPicPr>
+            <a:picLocks noChangeAspect="1"/>
+          </p:cNvPicPr>
+          <p:nvPr/>
+        </p:nvPicPr>
+        <p:blipFill rotWithShape="1">
+          <a:blip r:embed="rId4"/>
+          <a:srcRect t="5206"/>
+          <a:stretch/>
+        </p:blipFill>
+        <p:spPr>
+          <a:xfrm>
+            <a:off x="223236" y="4953649"/>
+            <a:ext cx="5268060" cy="1101702"/>
+          </a:xfrm>
+          <a:prstGeom prst="rect">
+            <a:avLst/>
+          </a:prstGeom>
+        </p:spPr>
+      </p:pic>
+      <p:pic>
+        <p:nvPicPr>
+          <p:cNvPr id="15" name="Picture 14">
+            <a:extLst>
+              <a:ext uri="{FF2B5EF4-FFF2-40B4-BE49-F238E27FC236}">
+                <a16:creationId xmlns:a16="http://schemas.microsoft.com/office/drawing/2014/main" id="{3C1DDB22-DB48-35E2-AA11-229F55E038D8}"/>
+              </a:ext>
+            </a:extLst>
+          </p:cNvPr>
+          <p:cNvPicPr>
+            <a:picLocks noChangeAspect="1"/>
+          </p:cNvPicPr>
+          <p:nvPr/>
+        </p:nvPicPr>
+        <p:blipFill rotWithShape="1">
+          <a:blip r:embed="rId5"/>
+          <a:srcRect t="3559"/>
+          <a:stretch/>
+        </p:blipFill>
+        <p:spPr>
+          <a:xfrm>
+            <a:off x="6328829" y="1741438"/>
+            <a:ext cx="5525271" cy="1304590"/>
+          </a:xfrm>
+          <a:prstGeom prst="rect">
+            <a:avLst/>
+          </a:prstGeom>
+        </p:spPr>
+      </p:pic>
+      <p:sp>
+        <p:nvSpPr>
+          <p:cNvPr id="16" name="TextBox 15">
+            <a:extLst>
+              <a:ext uri="{FF2B5EF4-FFF2-40B4-BE49-F238E27FC236}">
+                <a16:creationId xmlns:a16="http://schemas.microsoft.com/office/drawing/2014/main" id="{2C963E76-F61C-A1ED-E201-5541B2D5A580}"/>
+              </a:ext>
+            </a:extLst>
+          </p:cNvPr>
+          <p:cNvSpPr txBox="1"/>
+          <p:nvPr/>
+        </p:nvSpPr>
+        <p:spPr>
+          <a:xfrm>
+            <a:off x="76211" y="674439"/>
+            <a:ext cx="5676426" cy="307777"/>
+          </a:xfrm>
+          <a:prstGeom prst="rect">
+            <a:avLst/>
+          </a:prstGeom>
+          <a:noFill/>
+        </p:spPr>
+        <p:txBody>
+          <a:bodyPr wrap="none" rtlCol="0">
+            <a:spAutoFit/>
+          </a:bodyPr>
+          <a:lstStyle/>
+          <a:p>
+            <a:r>
+              <a:rPr lang="en-US" sz="1400" i="1" dirty="0"/>
+              <a:t>Example script found in /M2_CellRanger_Alignment/align_zebrahub_sra.sh</a:t>
+            </a:r>
+          </a:p>
+        </p:txBody>
+      </p:sp>
+      <p:sp>
+        <p:nvSpPr>
+          <p:cNvPr id="19" name="TextBox 18">
+            <a:extLst>
+              <a:ext uri="{FF2B5EF4-FFF2-40B4-BE49-F238E27FC236}">
+                <a16:creationId xmlns:a16="http://schemas.microsoft.com/office/drawing/2014/main" id="{D8FAAAD8-7F7F-8E25-083F-297BD2D283AD}"/>
+              </a:ext>
+            </a:extLst>
+          </p:cNvPr>
+          <p:cNvSpPr txBox="1"/>
+          <p:nvPr/>
+        </p:nvSpPr>
+        <p:spPr>
+          <a:xfrm>
+            <a:off x="889269" y="2544946"/>
+            <a:ext cx="1866138" cy="276999"/>
+          </a:xfrm>
+          <a:prstGeom prst="rect">
+            <a:avLst/>
+          </a:prstGeom>
+          <a:noFill/>
+        </p:spPr>
+        <p:txBody>
+          <a:bodyPr wrap="square">
+            <a:spAutoFit/>
+          </a:bodyPr>
+          <a:lstStyle/>
+          <a:p>
+            <a:r>
+              <a:rPr lang="en-US" sz="1200" dirty="0"/>
+              <a:t>./SRR23691690</a:t>
+            </a:r>
+          </a:p>
+        </p:txBody>
+      </p:sp>
+      <p:sp>
+        <p:nvSpPr>
+          <p:cNvPr id="20" name="TextBox 19">
+            <a:extLst>
+              <a:ext uri="{FF2B5EF4-FFF2-40B4-BE49-F238E27FC236}">
+                <a16:creationId xmlns:a16="http://schemas.microsoft.com/office/drawing/2014/main" id="{34607C47-BAA5-8263-1797-C0FA213D1D12}"/>
+              </a:ext>
+            </a:extLst>
+          </p:cNvPr>
+          <p:cNvSpPr txBox="1"/>
+          <p:nvPr/>
+        </p:nvSpPr>
+        <p:spPr>
+          <a:xfrm>
+            <a:off x="851169" y="3630507"/>
+            <a:ext cx="2454402" cy="1015663"/>
+          </a:xfrm>
+          <a:prstGeom prst="rect">
+            <a:avLst/>
+          </a:prstGeom>
+          <a:noFill/>
+        </p:spPr>
+        <p:txBody>
+          <a:bodyPr wrap="square">
+            <a:spAutoFit/>
+          </a:bodyPr>
+          <a:lstStyle/>
+          <a:p>
+            <a:r>
+              <a:rPr lang="en-US" sz="1200" dirty="0"/>
+              <a:t>./SRR23691690_1.fastq</a:t>
+            </a:r>
+          </a:p>
+          <a:p>
+            <a:r>
+              <a:rPr lang="en-US" sz="1200" dirty="0"/>
+              <a:t>./SRR23691690_2.fastq</a:t>
+            </a:r>
+          </a:p>
+          <a:p>
+            <a:r>
+              <a:rPr lang="en-US" sz="1200" dirty="0"/>
+              <a:t>./SRR23691690_3.fastq</a:t>
+            </a:r>
+          </a:p>
+          <a:p>
+            <a:r>
+              <a:rPr lang="en-US" sz="1200" dirty="0"/>
+              <a:t>./SRR23691690_4.fastq</a:t>
+            </a:r>
+          </a:p>
+          <a:p>
+            <a:endParaRPr lang="en-US" sz="1200" dirty="0"/>
+          </a:p>
+        </p:txBody>
+      </p:sp>
+      <p:sp>
+        <p:nvSpPr>
+          <p:cNvPr id="21" name="TextBox 20">
+            <a:extLst>
+              <a:ext uri="{FF2B5EF4-FFF2-40B4-BE49-F238E27FC236}">
+                <a16:creationId xmlns:a16="http://schemas.microsoft.com/office/drawing/2014/main" id="{DA2B85D9-30B5-A401-DA0E-5B677392C5E6}"/>
+              </a:ext>
+            </a:extLst>
+          </p:cNvPr>
+          <p:cNvSpPr txBox="1"/>
+          <p:nvPr/>
+        </p:nvSpPr>
+        <p:spPr>
+          <a:xfrm>
+            <a:off x="837204" y="6110427"/>
+            <a:ext cx="3186156" cy="461665"/>
+          </a:xfrm>
+          <a:prstGeom prst="rect">
+            <a:avLst/>
+          </a:prstGeom>
+          <a:noFill/>
+        </p:spPr>
+        <p:txBody>
+          <a:bodyPr wrap="square">
+            <a:spAutoFit/>
+          </a:bodyPr>
+          <a:lstStyle/>
+          <a:p>
+            <a:r>
+              <a:rPr lang="en-US" sz="1200" dirty="0"/>
+              <a:t>./SRR23691690_S1_L001_R1_001.fastq</a:t>
+            </a:r>
+          </a:p>
+          <a:p>
+            <a:r>
+              <a:rPr lang="en-US" sz="1200" dirty="0"/>
+              <a:t>./SRR23691690_S1_L001_R2_001.fastq</a:t>
+            </a:r>
+          </a:p>
+        </p:txBody>
+      </p:sp>
+      <p:pic>
+        <p:nvPicPr>
+          <p:cNvPr id="29" name="Picture 28">
+            <a:extLst>
+              <a:ext uri="{FF2B5EF4-FFF2-40B4-BE49-F238E27FC236}">
+                <a16:creationId xmlns:a16="http://schemas.microsoft.com/office/drawing/2014/main" id="{3267EBE4-412E-86F4-42E3-11F69D156DDB}"/>
+              </a:ext>
+            </a:extLst>
+          </p:cNvPr>
+          <p:cNvPicPr>
+            <a:picLocks noChangeAspect="1"/>
+          </p:cNvPicPr>
+          <p:nvPr/>
+        </p:nvPicPr>
+        <p:blipFill>
+          <a:blip r:embed="rId6"/>
+          <a:stretch>
+            <a:fillRect/>
+          </a:stretch>
+        </p:blipFill>
+        <p:spPr>
+          <a:xfrm>
+            <a:off x="6453455" y="3520470"/>
+            <a:ext cx="5010150" cy="2400300"/>
+          </a:xfrm>
+          <a:prstGeom prst="rect">
+            <a:avLst/>
+          </a:prstGeom>
+        </p:spPr>
+      </p:pic>
+      <p:pic>
+        <p:nvPicPr>
+          <p:cNvPr id="33" name="Picture 32">
+            <a:extLst>
+              <a:ext uri="{FF2B5EF4-FFF2-40B4-BE49-F238E27FC236}">
+                <a16:creationId xmlns:a16="http://schemas.microsoft.com/office/drawing/2014/main" id="{A410977A-F843-6C63-32C6-E4A330FA7A0F}"/>
+              </a:ext>
+            </a:extLst>
+          </p:cNvPr>
+          <p:cNvPicPr>
+            <a:picLocks noChangeAspect="1"/>
+          </p:cNvPicPr>
+          <p:nvPr/>
+        </p:nvPicPr>
+        <p:blipFill>
+          <a:blip r:embed="rId7"/>
+          <a:stretch>
+            <a:fillRect/>
+          </a:stretch>
+        </p:blipFill>
+        <p:spPr>
+          <a:xfrm>
+            <a:off x="223236" y="1144148"/>
+            <a:ext cx="6230219" cy="571580"/>
+          </a:xfrm>
+          <a:prstGeom prst="rect">
+            <a:avLst/>
+          </a:prstGeom>
+        </p:spPr>
+      </p:pic>
+    </p:spTree>
+    <p:extLst>
+      <p:ext uri="{BB962C8B-B14F-4D97-AF65-F5344CB8AC3E}">
+        <p14:creationId xmlns:p14="http://schemas.microsoft.com/office/powerpoint/2010/main" val="2103545050"/>
+      </p:ext>
+    </p:extLst>
+  </p:cSld>
+  <p:clrMapOvr>
+    <a:masterClrMapping/>
+  </p:clrMapOvr>
+</p:sld>
+</file>
+
+<file path=ppt/slides/slide9.xml><?xml version="1.0" encoding="utf-8"?>
+<p:sld xmlns:a="http://schemas.openxmlformats.org/drawingml/2006/main" xmlns:r="http://schemas.openxmlformats.org/officeDocument/2006/relationships" xmlns:p="http://schemas.openxmlformats.org/presentationml/2006/main">
+  <p:cSld>
+    <p:spTree>
+      <p:nvGrpSpPr>
+        <p:cNvPr id="1" name=""/>
+        <p:cNvGrpSpPr/>
+        <p:nvPr/>
+      </p:nvGrpSpPr>
+      <p:grpSpPr>
+        <a:xfrm>
+          <a:off x="0" y="0"/>
+          <a:ext cx="0" cy="0"/>
+          <a:chOff x="0" y="0"/>
+          <a:chExt cx="0" cy="0"/>
+        </a:xfrm>
+      </p:grpSpPr>
+      <p:sp>
+        <p:nvSpPr>
+          <p:cNvPr id="2" name="Title 1">
+            <a:extLst>
+              <a:ext uri="{FF2B5EF4-FFF2-40B4-BE49-F238E27FC236}">
                 <a16:creationId xmlns:a16="http://schemas.microsoft.com/office/drawing/2014/main" id="{1942DDF0-515E-238F-2A7E-655B0D47A6B7}"/>
               </a:ext>
             </a:extLst>
@@ -6331,13 +7510,13 @@
           <p:nvPr>
             <p:extLst>
               <p:ext uri="{D42A27DB-BD31-4B8C-83A1-F6EECF244321}">
-                <p14:modId xmlns:p14="http://schemas.microsoft.com/office/powerpoint/2010/main" val="3674244215"/>
+                <p14:modId xmlns:p14="http://schemas.microsoft.com/office/powerpoint/2010/main" val="2747797499"/>
               </p:ext>
             </p:extLst>
           </p:nvPr>
         </p:nvGraphicFramePr>
         <p:xfrm>
-          <a:off x="775779" y="1969994"/>
+          <a:off x="1144079" y="1695674"/>
           <a:ext cx="1841500" cy="1333500"/>
         </p:xfrm>
         <a:graphic>
@@ -7092,13 +8271,13 @@
           <p:nvPr>
             <p:extLst>
               <p:ext uri="{D42A27DB-BD31-4B8C-83A1-F6EECF244321}">
-                <p14:modId xmlns:p14="http://schemas.microsoft.com/office/powerpoint/2010/main" val="3016324866"/>
+                <p14:modId xmlns:p14="http://schemas.microsoft.com/office/powerpoint/2010/main" val="536689620"/>
               </p:ext>
             </p:extLst>
           </p:nvPr>
         </p:nvGraphicFramePr>
         <p:xfrm>
-          <a:off x="5359400" y="2857500"/>
+          <a:off x="4298696" y="2323562"/>
           <a:ext cx="1473200" cy="1143000"/>
         </p:xfrm>
         <a:graphic>
@@ -7622,13 +8801,13 @@
           <p:nvPr>
             <p:extLst>
               <p:ext uri="{D42A27DB-BD31-4B8C-83A1-F6EECF244321}">
-                <p14:modId xmlns:p14="http://schemas.microsoft.com/office/powerpoint/2010/main" val="335239009"/>
+                <p14:modId xmlns:p14="http://schemas.microsoft.com/office/powerpoint/2010/main" val="2612099784"/>
               </p:ext>
             </p:extLst>
           </p:nvPr>
         </p:nvGraphicFramePr>
         <p:xfrm>
-          <a:off x="1572404" y="4072815"/>
+          <a:off x="1144079" y="5160951"/>
           <a:ext cx="1473200" cy="1143000"/>
         </p:xfrm>
         <a:graphic>
@@ -8141,146 +9320,6 @@
     <p:extLst>
       <p:ext uri="{BB962C8B-B14F-4D97-AF65-F5344CB8AC3E}">
         <p14:creationId xmlns:p14="http://schemas.microsoft.com/office/powerpoint/2010/main" val="4107902956"/>
-      </p:ext>
-    </p:extLst>
-  </p:cSld>
-  <p:clrMapOvr>
-    <a:masterClrMapping/>
-  </p:clrMapOvr>
-</p:sld>
-</file>
-
-<file path=ppt/slides/slide9.xml><?xml version="1.0" encoding="utf-8"?>
-<p:sld xmlns:a="http://schemas.openxmlformats.org/drawingml/2006/main" xmlns:r="http://schemas.openxmlformats.org/officeDocument/2006/relationships" xmlns:p="http://schemas.openxmlformats.org/presentationml/2006/main">
-  <p:cSld>
-    <p:spTree>
-      <p:nvGrpSpPr>
-        <p:cNvPr id="1" name=""/>
-        <p:cNvGrpSpPr/>
-        <p:nvPr/>
-      </p:nvGrpSpPr>
-      <p:grpSpPr>
-        <a:xfrm>
-          <a:off x="0" y="0"/>
-          <a:ext cx="0" cy="0"/>
-          <a:chOff x="0" y="0"/>
-          <a:chExt cx="0" cy="0"/>
-        </a:xfrm>
-      </p:grpSpPr>
-      <p:sp>
-        <p:nvSpPr>
-          <p:cNvPr id="2" name="Title 1">
-            <a:extLst>
-              <a:ext uri="{FF2B5EF4-FFF2-40B4-BE49-F238E27FC236}">
-                <a16:creationId xmlns:a16="http://schemas.microsoft.com/office/drawing/2014/main" id="{15FF008D-6109-C04B-2DD5-F18725394719}"/>
-              </a:ext>
-            </a:extLst>
-          </p:cNvPr>
-          <p:cNvSpPr>
-            <a:spLocks noGrp="1"/>
-          </p:cNvSpPr>
-          <p:nvPr>
-            <p:ph type="title"/>
-          </p:nvPr>
-        </p:nvSpPr>
-        <p:spPr/>
-        <p:txBody>
-          <a:bodyPr/>
-          <a:lstStyle/>
-          <a:p>
-            <a:r>
-              <a:rPr lang="en-US" dirty="0"/>
-              <a:t>Cell Ranger Setup and Script</a:t>
-            </a:r>
-          </a:p>
-        </p:txBody>
-      </p:sp>
-      <p:sp>
-        <p:nvSpPr>
-          <p:cNvPr id="4" name="TextBox 3">
-            <a:extLst>
-              <a:ext uri="{FF2B5EF4-FFF2-40B4-BE49-F238E27FC236}">
-                <a16:creationId xmlns:a16="http://schemas.microsoft.com/office/drawing/2014/main" id="{CC1F8028-DD48-21C8-784C-0351ADD5D02F}"/>
-              </a:ext>
-            </a:extLst>
-          </p:cNvPr>
-          <p:cNvSpPr txBox="1"/>
-          <p:nvPr/>
-        </p:nvSpPr>
-        <p:spPr>
-          <a:xfrm>
-            <a:off x="4729655" y="6627168"/>
-            <a:ext cx="5155323" cy="230832"/>
-          </a:xfrm>
-          <a:prstGeom prst="rect">
-            <a:avLst/>
-          </a:prstGeom>
-          <a:noFill/>
-        </p:spPr>
-        <p:txBody>
-          <a:bodyPr wrap="square">
-            <a:spAutoFit/>
-          </a:bodyPr>
-          <a:lstStyle/>
-          <a:p>
-            <a:pPr algn="r"/>
-            <a:r>
-              <a:rPr lang="en-US" sz="900" i="1" dirty="0">
-                <a:solidFill>
-                  <a:schemeClr val="bg1">
-                    <a:lumMod val="50000"/>
-                  </a:schemeClr>
-                </a:solidFill>
-              </a:rPr>
-              <a:t>https://www.10xgenomics.com/support/software/cell-ranger/algorithms-overview/</a:t>
-            </a:r>
-            <a:r>
-              <a:rPr lang="en-US" sz="900" i="1" dirty="0" err="1">
-                <a:solidFill>
-                  <a:schemeClr val="bg1">
-                    <a:lumMod val="50000"/>
-                  </a:schemeClr>
-                </a:solidFill>
-              </a:rPr>
-              <a:t>cr</a:t>
-            </a:r>
-            <a:r>
-              <a:rPr lang="en-US" sz="900" i="1" dirty="0">
-                <a:solidFill>
-                  <a:schemeClr val="bg1">
-                    <a:lumMod val="50000"/>
-                  </a:schemeClr>
-                </a:solidFill>
-              </a:rPr>
-              <a:t>-</a:t>
-            </a:r>
-            <a:r>
-              <a:rPr lang="en-US" sz="900" i="1" dirty="0" err="1">
-                <a:solidFill>
-                  <a:schemeClr val="bg1">
-                    <a:lumMod val="50000"/>
-                  </a:schemeClr>
-                </a:solidFill>
-              </a:rPr>
-              <a:t>gex</a:t>
-            </a:r>
-            <a:r>
-              <a:rPr lang="en-US" sz="900" i="1" dirty="0">
-                <a:solidFill>
-                  <a:schemeClr val="bg1">
-                    <a:lumMod val="50000"/>
-                  </a:schemeClr>
-                </a:solidFill>
-              </a:rPr>
-              <a:t>-algorithm</a:t>
-            </a:r>
-          </a:p>
-        </p:txBody>
-      </p:sp>
-    </p:spTree>
-    <p:extLst>
-      <p:ext uri="{BB962C8B-B14F-4D97-AF65-F5344CB8AC3E}">
-        <p14:creationId xmlns:p14="http://schemas.microsoft.com/office/powerpoint/2010/main" val="2103545050"/>
       </p:ext>
     </p:extLst>
   </p:cSld>

</xml_diff>

<commit_message>
Finishing M3 and reorganizing other modules.
</commit_message>
<xml_diff>
--- a/M2_CellRanger_Alignment/M2_CellRanger.pptx
+++ b/M2_CellRanger_Alignment/M2_CellRanger.pptx
@@ -208,7 +208,7 @@
           <a:p>
             <a:fld id="{FF40CFF0-3E11-4AF6-9747-7919C58FBC48}" type="datetimeFigureOut">
               <a:rPr lang="en-US" smtClean="0"/>
-              <a:t>1/10/2024</a:t>
+              <a:t>2/2/2024</a:t>
             </a:fld>
             <a:endParaRPr lang="en-US"/>
           </a:p>
@@ -632,7 +632,7 @@
           <a:p>
             <a:fld id="{9F69634C-F75C-45F7-A87A-C5E2AF3ECA41}" type="datetimeFigureOut">
               <a:rPr lang="en-US" smtClean="0"/>
-              <a:t>1/10/2024</a:t>
+              <a:t>2/2/2024</a:t>
             </a:fld>
             <a:endParaRPr lang="en-US"/>
           </a:p>
@@ -797,7 +797,7 @@
           <a:p>
             <a:fld id="{9F69634C-F75C-45F7-A87A-C5E2AF3ECA41}" type="datetimeFigureOut">
               <a:rPr lang="en-US" smtClean="0"/>
-              <a:t>1/10/2024</a:t>
+              <a:t>2/2/2024</a:t>
             </a:fld>
             <a:endParaRPr lang="en-US"/>
           </a:p>
@@ -1000,7 +1000,7 @@
           <a:p>
             <a:fld id="{9F69634C-F75C-45F7-A87A-C5E2AF3ECA41}" type="datetimeFigureOut">
               <a:rPr lang="en-US" smtClean="0"/>
-              <a:t>1/10/2024</a:t>
+              <a:t>2/2/2024</a:t>
             </a:fld>
             <a:endParaRPr lang="en-US"/>
           </a:p>
@@ -1265,7 +1265,7 @@
           <a:p>
             <a:fld id="{9F69634C-F75C-45F7-A87A-C5E2AF3ECA41}" type="datetimeFigureOut">
               <a:rPr lang="en-US" smtClean="0"/>
-              <a:t>1/10/2024</a:t>
+              <a:t>2/2/2024</a:t>
             </a:fld>
             <a:endParaRPr lang="en-US"/>
           </a:p>
@@ -1378,7 +1378,7 @@
           <a:p>
             <a:fld id="{9F69634C-F75C-45F7-A87A-C5E2AF3ECA41}" type="datetimeFigureOut">
               <a:rPr lang="en-US" smtClean="0"/>
-              <a:t>1/10/2024</a:t>
+              <a:t>2/2/2024</a:t>
             </a:fld>
             <a:endParaRPr lang="en-US"/>
           </a:p>
@@ -1620,7 +1620,7 @@
           <a:p>
             <a:fld id="{9F69634C-F75C-45F7-A87A-C5E2AF3ECA41}" type="datetimeFigureOut">
               <a:rPr lang="en-US" smtClean="0"/>
-              <a:t>1/10/2024</a:t>
+              <a:t>2/2/2024</a:t>
             </a:fld>
             <a:endParaRPr lang="en-US"/>
           </a:p>
@@ -2617,7 +2617,7 @@
         </p:nvSpPr>
         <p:spPr>
           <a:xfrm>
-            <a:off x="313112" y="2472938"/>
+            <a:off x="313112" y="2646674"/>
             <a:ext cx="11702103" cy="1200329"/>
           </a:xfrm>
           <a:prstGeom prst="rect">
@@ -2670,195 +2670,6 @@
           </a:p>
         </p:txBody>
       </p:sp>
-      <p:graphicFrame>
-        <p:nvGraphicFramePr>
-          <p:cNvPr id="17" name="Object 16">
-            <a:extLst>
-              <a:ext uri="{FF2B5EF4-FFF2-40B4-BE49-F238E27FC236}">
-                <a16:creationId xmlns:a16="http://schemas.microsoft.com/office/drawing/2014/main" id="{D29FF9F2-614C-6047-F4C6-675E955AE997}"/>
-              </a:ext>
-            </a:extLst>
-          </p:cNvPr>
-          <p:cNvGraphicFramePr>
-            <a:graphicFrameLocks noChangeAspect="1"/>
-          </p:cNvGraphicFramePr>
-          <p:nvPr>
-            <p:extLst>
-              <p:ext uri="{D42A27DB-BD31-4B8C-83A1-F6EECF244321}">
-                <p14:modId xmlns:p14="http://schemas.microsoft.com/office/powerpoint/2010/main" val="1060248165"/>
-              </p:ext>
-            </p:extLst>
-          </p:nvPr>
-        </p:nvGraphicFramePr>
-        <p:xfrm>
-          <a:off x="2163508" y="815126"/>
-          <a:ext cx="1628775" cy="1152525"/>
-        </p:xfrm>
-        <a:graphic>
-          <a:graphicData uri="http://schemas.openxmlformats.org/presentationml/2006/ole">
-            <mc:AlternateContent xmlns:mc="http://schemas.openxmlformats.org/markup-compatibility/2006">
-              <mc:Choice xmlns:v="urn:schemas-microsoft-com:vml" Requires="v">
-                <p:oleObj name="Worksheet" r:id="rId2" imgW="1628916" imgH="1152422" progId="Excel.Sheet.12">
-                  <p:embed/>
-                </p:oleObj>
-              </mc:Choice>
-              <mc:Fallback>
-                <p:oleObj name="Worksheet" r:id="rId2" imgW="1628916" imgH="1152422" progId="Excel.Sheet.12">
-                  <p:embed/>
-                  <p:pic>
-                    <p:nvPicPr>
-                      <p:cNvPr id="0" name=""/>
-                      <p:cNvPicPr/>
-                      <p:nvPr/>
-                    </p:nvPicPr>
-                    <p:blipFill>
-                      <a:blip r:embed="rId3"/>
-                      <a:stretch>
-                        <a:fillRect/>
-                      </a:stretch>
-                    </p:blipFill>
-                    <p:spPr>
-                      <a:xfrm>
-                        <a:off x="2163508" y="815126"/>
-                        <a:ext cx="1628775" cy="1152525"/>
-                      </a:xfrm>
-                      <a:prstGeom prst="rect">
-                        <a:avLst/>
-                      </a:prstGeom>
-                    </p:spPr>
-                  </p:pic>
-                </p:oleObj>
-              </mc:Fallback>
-            </mc:AlternateContent>
-          </a:graphicData>
-        </a:graphic>
-      </p:graphicFrame>
-      <p:graphicFrame>
-        <p:nvGraphicFramePr>
-          <p:cNvPr id="18" name="Object 17">
-            <a:extLst>
-              <a:ext uri="{FF2B5EF4-FFF2-40B4-BE49-F238E27FC236}">
-                <a16:creationId xmlns:a16="http://schemas.microsoft.com/office/drawing/2014/main" id="{DDF21040-03C8-1C19-FA17-ACADAE1DBDF9}"/>
-              </a:ext>
-            </a:extLst>
-          </p:cNvPr>
-          <p:cNvGraphicFramePr>
-            <a:graphicFrameLocks noChangeAspect="1"/>
-          </p:cNvGraphicFramePr>
-          <p:nvPr>
-            <p:extLst>
-              <p:ext uri="{D42A27DB-BD31-4B8C-83A1-F6EECF244321}">
-                <p14:modId xmlns:p14="http://schemas.microsoft.com/office/powerpoint/2010/main" val="4156918528"/>
-              </p:ext>
-            </p:extLst>
-          </p:nvPr>
-        </p:nvGraphicFramePr>
-        <p:xfrm>
-          <a:off x="5511700" y="815126"/>
-          <a:ext cx="1304925" cy="1152525"/>
-        </p:xfrm>
-        <a:graphic>
-          <a:graphicData uri="http://schemas.openxmlformats.org/presentationml/2006/ole">
-            <mc:AlternateContent xmlns:mc="http://schemas.openxmlformats.org/markup-compatibility/2006">
-              <mc:Choice xmlns:v="urn:schemas-microsoft-com:vml" Requires="v">
-                <p:oleObj name="Worksheet" r:id="rId4" imgW="1304798" imgH="1152422" progId="Excel.Sheet.12">
-                  <p:embed/>
-                </p:oleObj>
-              </mc:Choice>
-              <mc:Fallback>
-                <p:oleObj name="Worksheet" r:id="rId4" imgW="1304798" imgH="1152422" progId="Excel.Sheet.12">
-                  <p:embed/>
-                  <p:pic>
-                    <p:nvPicPr>
-                      <p:cNvPr id="0" name=""/>
-                      <p:cNvPicPr/>
-                      <p:nvPr/>
-                    </p:nvPicPr>
-                    <p:blipFill>
-                      <a:blip r:embed="rId5"/>
-                      <a:stretch>
-                        <a:fillRect/>
-                      </a:stretch>
-                    </p:blipFill>
-                    <p:spPr>
-                      <a:xfrm>
-                        <a:off x="5511700" y="815126"/>
-                        <a:ext cx="1304925" cy="1152525"/>
-                      </a:xfrm>
-                      <a:prstGeom prst="rect">
-                        <a:avLst/>
-                      </a:prstGeom>
-                    </p:spPr>
-                  </p:pic>
-                </p:oleObj>
-              </mc:Fallback>
-            </mc:AlternateContent>
-          </a:graphicData>
-        </a:graphic>
-      </p:graphicFrame>
-      <p:graphicFrame>
-        <p:nvGraphicFramePr>
-          <p:cNvPr id="19" name="Object 18">
-            <a:extLst>
-              <a:ext uri="{FF2B5EF4-FFF2-40B4-BE49-F238E27FC236}">
-                <a16:creationId xmlns:a16="http://schemas.microsoft.com/office/drawing/2014/main" id="{15D0CC02-A8AB-73AC-DFC7-B60199F9E40E}"/>
-              </a:ext>
-            </a:extLst>
-          </p:cNvPr>
-          <p:cNvGraphicFramePr>
-            <a:graphicFrameLocks noChangeAspect="1"/>
-          </p:cNvGraphicFramePr>
-          <p:nvPr>
-            <p:extLst>
-              <p:ext uri="{D42A27DB-BD31-4B8C-83A1-F6EECF244321}">
-                <p14:modId xmlns:p14="http://schemas.microsoft.com/office/powerpoint/2010/main" val="45542800"/>
-              </p:ext>
-            </p:extLst>
-          </p:nvPr>
-        </p:nvGraphicFramePr>
-        <p:xfrm>
-          <a:off x="8536042" y="815126"/>
-          <a:ext cx="1304925" cy="1152525"/>
-        </p:xfrm>
-        <a:graphic>
-          <a:graphicData uri="http://schemas.openxmlformats.org/presentationml/2006/ole">
-            <mc:AlternateContent xmlns:mc="http://schemas.openxmlformats.org/markup-compatibility/2006">
-              <mc:Choice xmlns:v="urn:schemas-microsoft-com:vml" Requires="v">
-                <p:oleObj name="Worksheet" r:id="rId6" imgW="1304798" imgH="1152422" progId="Excel.Sheet.12">
-                  <p:embed/>
-                </p:oleObj>
-              </mc:Choice>
-              <mc:Fallback>
-                <p:oleObj name="Worksheet" r:id="rId6" imgW="1304798" imgH="1152422" progId="Excel.Sheet.12">
-                  <p:embed/>
-                  <p:pic>
-                    <p:nvPicPr>
-                      <p:cNvPr id="0" name=""/>
-                      <p:cNvPicPr/>
-                      <p:nvPr/>
-                    </p:nvPicPr>
-                    <p:blipFill>
-                      <a:blip r:embed="rId7"/>
-                      <a:stretch>
-                        <a:fillRect/>
-                      </a:stretch>
-                    </p:blipFill>
-                    <p:spPr>
-                      <a:xfrm>
-                        <a:off x="8536042" y="815126"/>
-                        <a:ext cx="1304925" cy="1152525"/>
-                      </a:xfrm>
-                      <a:prstGeom prst="rect">
-                        <a:avLst/>
-                      </a:prstGeom>
-                    </p:spPr>
-                  </p:pic>
-                </p:oleObj>
-              </mc:Fallback>
-            </mc:AlternateContent>
-          </a:graphicData>
-        </a:graphic>
-      </p:graphicFrame>
       <p:pic>
         <p:nvPicPr>
           <p:cNvPr id="1026" name="Picture 2">
@@ -2874,7 +2685,7 @@
           <p:nvPr/>
         </p:nvPicPr>
         <p:blipFill>
-          <a:blip r:embed="rId8">
+          <a:blip r:embed="rId2">
             <a:extLst>
               <a:ext uri="{28A0092B-C50C-407E-A947-70E740481C1C}">
                 <a14:useLocalDpi xmlns:a14="http://schemas.microsoft.com/office/drawing/2010/main" val="0"/>
@@ -2920,8 +2731,8 @@
         </p:nvSpPr>
         <p:spPr>
           <a:xfrm>
-            <a:off x="2369909" y="1975203"/>
-            <a:ext cx="1215974" cy="369332"/>
+            <a:off x="1636658" y="2179775"/>
+            <a:ext cx="1200842" cy="307777"/>
           </a:xfrm>
           <a:prstGeom prst="rect">
             <a:avLst/>
@@ -2935,10 +2746,14 @@
           <a:lstStyle/>
           <a:p>
             <a:r>
-              <a:rPr lang="en-US" dirty="0" err="1"/>
+              <a:rPr lang="en-US" sz="1400" dirty="0"/>
+              <a:t>&gt;&gt; </a:t>
+            </a:r>
+            <a:r>
+              <a:rPr lang="en-US" sz="1400" dirty="0" err="1"/>
               <a:t>matrix.mtx</a:t>
             </a:r>
-            <a:endParaRPr lang="en-US" dirty="0"/>
+            <a:endParaRPr lang="en-US" sz="1400" dirty="0"/>
           </a:p>
         </p:txBody>
       </p:sp>
@@ -2956,8 +2771,8 @@
         </p:nvSpPr>
         <p:spPr>
           <a:xfrm>
-            <a:off x="8635622" y="1975203"/>
-            <a:ext cx="1358770" cy="369332"/>
+            <a:off x="8653288" y="2179775"/>
+            <a:ext cx="1320170" cy="307777"/>
           </a:xfrm>
           <a:prstGeom prst="rect">
             <a:avLst/>
@@ -2971,10 +2786,14 @@
           <a:lstStyle/>
           <a:p>
             <a:r>
-              <a:rPr lang="en-US" dirty="0" err="1"/>
+              <a:rPr lang="en-US" sz="1400" dirty="0"/>
+              <a:t>&gt;&gt; </a:t>
+            </a:r>
+            <a:r>
+              <a:rPr lang="en-US" sz="1400" dirty="0" err="1"/>
               <a:t>barcodes.tsv</a:t>
             </a:r>
-            <a:endParaRPr lang="en-US" dirty="0"/>
+            <a:endParaRPr lang="en-US" sz="1400" dirty="0"/>
           </a:p>
         </p:txBody>
       </p:sp>
@@ -2992,8 +2811,8 @@
         </p:nvSpPr>
         <p:spPr>
           <a:xfrm>
-            <a:off x="5628554" y="1975203"/>
-            <a:ext cx="1312282" cy="369332"/>
+            <a:off x="5340026" y="2179775"/>
+            <a:ext cx="1256434" cy="307777"/>
           </a:xfrm>
           <a:prstGeom prst="rect">
             <a:avLst/>
@@ -3007,13 +2826,206 @@
           <a:lstStyle/>
           <a:p>
             <a:r>
-              <a:rPr lang="en-US" dirty="0" err="1"/>
+              <a:rPr lang="en-US" sz="1400" dirty="0"/>
+              <a:t>&gt;&gt; </a:t>
+            </a:r>
+            <a:r>
+              <a:rPr lang="en-US" sz="1400" dirty="0" err="1"/>
               <a:t>features.tsv</a:t>
             </a:r>
-            <a:endParaRPr lang="en-US" dirty="0"/>
+            <a:endParaRPr lang="en-US" sz="1400" dirty="0"/>
           </a:p>
         </p:txBody>
       </p:sp>
+      <p:graphicFrame>
+        <p:nvGraphicFramePr>
+          <p:cNvPr id="6" name="Object 5">
+            <a:extLst>
+              <a:ext uri="{FF2B5EF4-FFF2-40B4-BE49-F238E27FC236}">
+                <a16:creationId xmlns:a16="http://schemas.microsoft.com/office/drawing/2014/main" id="{FFC927AB-B526-DDB5-9A2F-40F77904AD45}"/>
+              </a:ext>
+            </a:extLst>
+          </p:cNvPr>
+          <p:cNvGraphicFramePr>
+            <a:graphicFrameLocks noChangeAspect="1"/>
+          </p:cNvGraphicFramePr>
+          <p:nvPr>
+            <p:extLst>
+              <p:ext uri="{D42A27DB-BD31-4B8C-83A1-F6EECF244321}">
+                <p14:modId xmlns:p14="http://schemas.microsoft.com/office/powerpoint/2010/main" val="1882670639"/>
+              </p:ext>
+            </p:extLst>
+          </p:nvPr>
+        </p:nvGraphicFramePr>
+        <p:xfrm>
+          <a:off x="1782962" y="760452"/>
+          <a:ext cx="1428750" cy="1371600"/>
+        </p:xfrm>
+        <a:graphic>
+          <a:graphicData uri="http://schemas.openxmlformats.org/presentationml/2006/ole">
+            <mc:AlternateContent xmlns:mc="http://schemas.openxmlformats.org/markup-compatibility/2006">
+              <mc:Choice xmlns:v="urn:schemas-microsoft-com:vml" Requires="v">
+                <p:oleObj name="Worksheet" r:id="rId3" imgW="1428685" imgH="1371716" progId="Excel.Sheet.12">
+                  <p:embed/>
+                </p:oleObj>
+              </mc:Choice>
+              <mc:Fallback>
+                <p:oleObj name="Worksheet" r:id="rId3" imgW="1428685" imgH="1371716" progId="Excel.Sheet.12">
+                  <p:embed/>
+                  <p:pic>
+                    <p:nvPicPr>
+                      <p:cNvPr id="0" name=""/>
+                      <p:cNvPicPr/>
+                      <p:nvPr/>
+                    </p:nvPicPr>
+                    <p:blipFill>
+                      <a:blip r:embed="rId4"/>
+                      <a:stretch>
+                        <a:fillRect/>
+                      </a:stretch>
+                    </p:blipFill>
+                    <p:spPr>
+                      <a:xfrm>
+                        <a:off x="1782962" y="760452"/>
+                        <a:ext cx="1428750" cy="1371600"/>
+                      </a:xfrm>
+                      <a:prstGeom prst="rect">
+                        <a:avLst/>
+                      </a:prstGeom>
+                    </p:spPr>
+                  </p:pic>
+                </p:oleObj>
+              </mc:Fallback>
+            </mc:AlternateContent>
+          </a:graphicData>
+        </a:graphic>
+      </p:graphicFrame>
+      <p:graphicFrame>
+        <p:nvGraphicFramePr>
+          <p:cNvPr id="8" name="Object 7">
+            <a:extLst>
+              <a:ext uri="{FF2B5EF4-FFF2-40B4-BE49-F238E27FC236}">
+                <a16:creationId xmlns:a16="http://schemas.microsoft.com/office/drawing/2014/main" id="{13FE65DA-4B6D-F88C-84C3-9260472D31C0}"/>
+              </a:ext>
+            </a:extLst>
+          </p:cNvPr>
+          <p:cNvGraphicFramePr>
+            <a:graphicFrameLocks noChangeAspect="1"/>
+          </p:cNvGraphicFramePr>
+          <p:nvPr>
+            <p:extLst>
+              <p:ext uri="{D42A27DB-BD31-4B8C-83A1-F6EECF244321}">
+                <p14:modId xmlns:p14="http://schemas.microsoft.com/office/powerpoint/2010/main" val="3194030151"/>
+              </p:ext>
+            </p:extLst>
+          </p:nvPr>
+        </p:nvGraphicFramePr>
+        <p:xfrm>
+          <a:off x="5381480" y="760452"/>
+          <a:ext cx="1257300" cy="1409700"/>
+        </p:xfrm>
+        <a:graphic>
+          <a:graphicData uri="http://schemas.openxmlformats.org/presentationml/2006/ole">
+            <mc:AlternateContent xmlns:mc="http://schemas.openxmlformats.org/markup-compatibility/2006">
+              <mc:Choice xmlns:v="urn:schemas-microsoft-com:vml" Requires="v">
+                <p:oleObj name="Worksheet" r:id="rId5" imgW="1257257" imgH="1409597" progId="Excel.Sheet.12">
+                  <p:embed/>
+                </p:oleObj>
+              </mc:Choice>
+              <mc:Fallback>
+                <p:oleObj name="Worksheet" r:id="rId5" imgW="1257257" imgH="1409597" progId="Excel.Sheet.12">
+                  <p:embed/>
+                  <p:pic>
+                    <p:nvPicPr>
+                      <p:cNvPr id="0" name=""/>
+                      <p:cNvPicPr/>
+                      <p:nvPr/>
+                    </p:nvPicPr>
+                    <p:blipFill>
+                      <a:blip r:embed="rId6"/>
+                      <a:stretch>
+                        <a:fillRect/>
+                      </a:stretch>
+                    </p:blipFill>
+                    <p:spPr>
+                      <a:xfrm>
+                        <a:off x="5381480" y="760452"/>
+                        <a:ext cx="1257300" cy="1409700"/>
+                      </a:xfrm>
+                      <a:prstGeom prst="rect">
+                        <a:avLst/>
+                      </a:prstGeom>
+                    </p:spPr>
+                  </p:pic>
+                </p:oleObj>
+              </mc:Fallback>
+            </mc:AlternateContent>
+          </a:graphicData>
+        </a:graphic>
+      </p:graphicFrame>
+      <p:graphicFrame>
+        <p:nvGraphicFramePr>
+          <p:cNvPr id="10" name="Object 9">
+            <a:extLst>
+              <a:ext uri="{FF2B5EF4-FFF2-40B4-BE49-F238E27FC236}">
+                <a16:creationId xmlns:a16="http://schemas.microsoft.com/office/drawing/2014/main" id="{B6FA931E-6D52-E158-B38F-6844B84DBFF9}"/>
+              </a:ext>
+            </a:extLst>
+          </p:cNvPr>
+          <p:cNvGraphicFramePr>
+            <a:graphicFrameLocks noChangeAspect="1"/>
+          </p:cNvGraphicFramePr>
+          <p:nvPr>
+            <p:extLst>
+              <p:ext uri="{D42A27DB-BD31-4B8C-83A1-F6EECF244321}">
+                <p14:modId xmlns:p14="http://schemas.microsoft.com/office/powerpoint/2010/main" val="1431068715"/>
+              </p:ext>
+            </p:extLst>
+          </p:nvPr>
+        </p:nvGraphicFramePr>
+        <p:xfrm>
+          <a:off x="8808548" y="760452"/>
+          <a:ext cx="1009650" cy="1409700"/>
+        </p:xfrm>
+        <a:graphic>
+          <a:graphicData uri="http://schemas.openxmlformats.org/presentationml/2006/ole">
+            <mc:AlternateContent xmlns:mc="http://schemas.openxmlformats.org/markup-compatibility/2006">
+              <mc:Choice xmlns:v="urn:schemas-microsoft-com:vml" Requires="v">
+                <p:oleObj name="Worksheet" r:id="rId7" imgW="1009484" imgH="1409597" progId="Excel.Sheet.12">
+                  <p:embed/>
+                </p:oleObj>
+              </mc:Choice>
+              <mc:Fallback>
+                <p:oleObj name="Worksheet" r:id="rId7" imgW="1009484" imgH="1409597" progId="Excel.Sheet.12">
+                  <p:embed/>
+                  <p:pic>
+                    <p:nvPicPr>
+                      <p:cNvPr id="0" name=""/>
+                      <p:cNvPicPr/>
+                      <p:nvPr/>
+                    </p:nvPicPr>
+                    <p:blipFill>
+                      <a:blip r:embed="rId8"/>
+                      <a:stretch>
+                        <a:fillRect/>
+                      </a:stretch>
+                    </p:blipFill>
+                    <p:spPr>
+                      <a:xfrm>
+                        <a:off x="8808548" y="760452"/>
+                        <a:ext cx="1009650" cy="1409700"/>
+                      </a:xfrm>
+                      <a:prstGeom prst="rect">
+                        <a:avLst/>
+                      </a:prstGeom>
+                    </p:spPr>
+                  </p:pic>
+                </p:oleObj>
+              </mc:Fallback>
+            </mc:AlternateContent>
+          </a:graphicData>
+        </a:graphic>
+      </p:graphicFrame>
     </p:spTree>
     <p:extLst>
       <p:ext uri="{BB962C8B-B14F-4D97-AF65-F5344CB8AC3E}">

</xml_diff>

<commit_message>
Updates to slides, removed names to all slide decks but first module.
</commit_message>
<xml_diff>
--- a/M2_CellRanger_Alignment/M2_CellRanger.pptx
+++ b/M2_CellRanger_Alignment/M2_CellRanger.pptx
@@ -248,7 +248,7 @@
           <a:p>
             <a:fld id="{FF40CFF0-3E11-4AF6-9747-7919C58FBC48}" type="datetimeFigureOut">
               <a:rPr lang="en-US" smtClean="0"/>
-              <a:t>2/5/24</a:t>
+              <a:t>4/3/2024</a:t>
             </a:fld>
             <a:endParaRPr lang="en-US"/>
           </a:p>
@@ -869,7 +869,7 @@
           <a:p>
             <a:fld id="{9F69634C-F75C-45F7-A87A-C5E2AF3ECA41}" type="datetimeFigureOut">
               <a:rPr lang="en-US" smtClean="0"/>
-              <a:t>2/5/24</a:t>
+              <a:t>4/3/2024</a:t>
             </a:fld>
             <a:endParaRPr lang="en-US"/>
           </a:p>
@@ -1034,7 +1034,7 @@
           <a:p>
             <a:fld id="{9F69634C-F75C-45F7-A87A-C5E2AF3ECA41}" type="datetimeFigureOut">
               <a:rPr lang="en-US" smtClean="0"/>
-              <a:t>2/5/24</a:t>
+              <a:t>4/3/2024</a:t>
             </a:fld>
             <a:endParaRPr lang="en-US"/>
           </a:p>
@@ -1237,7 +1237,7 @@
           <a:p>
             <a:fld id="{9F69634C-F75C-45F7-A87A-C5E2AF3ECA41}" type="datetimeFigureOut">
               <a:rPr lang="en-US" smtClean="0"/>
-              <a:t>2/5/24</a:t>
+              <a:t>4/3/2024</a:t>
             </a:fld>
             <a:endParaRPr lang="en-US"/>
           </a:p>
@@ -1502,7 +1502,7 @@
           <a:p>
             <a:fld id="{9F69634C-F75C-45F7-A87A-C5E2AF3ECA41}" type="datetimeFigureOut">
               <a:rPr lang="en-US" smtClean="0"/>
-              <a:t>2/5/24</a:t>
+              <a:t>4/3/2024</a:t>
             </a:fld>
             <a:endParaRPr lang="en-US"/>
           </a:p>
@@ -1615,7 +1615,7 @@
           <a:p>
             <a:fld id="{9F69634C-F75C-45F7-A87A-C5E2AF3ECA41}" type="datetimeFigureOut">
               <a:rPr lang="en-US" smtClean="0"/>
-              <a:t>2/5/24</a:t>
+              <a:t>4/3/2024</a:t>
             </a:fld>
             <a:endParaRPr lang="en-US"/>
           </a:p>
@@ -1857,7 +1857,7 @@
           <a:p>
             <a:fld id="{9F69634C-F75C-45F7-A87A-C5E2AF3ECA41}" type="datetimeFigureOut">
               <a:rPr lang="en-US" smtClean="0"/>
-              <a:t>2/5/24</a:t>
+              <a:t>4/3/2024</a:t>
             </a:fld>
             <a:endParaRPr lang="en-US"/>
           </a:p>
@@ -2711,15 +2711,10 @@
               <a:t>scRNA</a:t>
             </a:r>
             <a:r>
-              <a:rPr lang="en-US" dirty="0"/>
-              <a:t> Workshop, 2024</a:t>
-            </a:r>
-          </a:p>
-          <a:p>
-            <a:r>
-              <a:rPr lang="en-US" dirty="0"/>
-              <a:t>Bruce Corliss, PhD and Allison Dickey, PhD</a:t>
-            </a:r>
+              <a:rPr lang="en-US"/>
+              <a:t>-Seq Workshop, 2024</a:t>
+            </a:r>
+            <a:endParaRPr lang="en-US" dirty="0"/>
           </a:p>
         </p:txBody>
       </p:sp>

</xml_diff>

<commit_message>
Updates/corrections with power points.
</commit_message>
<xml_diff>
--- a/M2_CellRanger_Alignment/M2_CellRanger.pptx
+++ b/M2_CellRanger_Alignment/M2_CellRanger.pptx
@@ -5,7 +5,7 @@
     <p:sldMasterId id="2147483656" r:id="rId1"/>
   </p:sldMasterIdLst>
   <p:notesMasterIdLst>
-    <p:notesMasterId r:id="rId14"/>
+    <p:notesMasterId r:id="rId13"/>
   </p:notesMasterIdLst>
   <p:sldIdLst>
     <p:sldId id="256" r:id="rId2"/>
@@ -18,8 +18,7 @@
     <p:sldId id="270" r:id="rId9"/>
     <p:sldId id="265" r:id="rId10"/>
     <p:sldId id="268" r:id="rId11"/>
-    <p:sldId id="266" r:id="rId12"/>
-    <p:sldId id="269" r:id="rId13"/>
+    <p:sldId id="269" r:id="rId12"/>
   </p:sldIdLst>
   <p:sldSz cx="12192000" cy="6858000"/>
   <p:notesSz cx="6858000" cy="9144000"/>
@@ -248,7 +247,7 @@
           <a:p>
             <a:fld id="{FF40CFF0-3E11-4AF6-9747-7919C58FBC48}" type="datetimeFigureOut">
               <a:rPr lang="en-US" smtClean="0"/>
-              <a:t>4/3/2024</a:t>
+              <a:t>4/4/24</a:t>
             </a:fld>
             <a:endParaRPr lang="en-US"/>
           </a:p>
@@ -693,7 +692,7 @@
           <a:p>
             <a:fld id="{121E9C32-9AD5-4F50-8DB4-01491388DC2B}" type="slidenum">
               <a:rPr lang="en-US" smtClean="0"/>
-              <a:t>12</a:t>
+              <a:t>11</a:t>
             </a:fld>
             <a:endParaRPr lang="en-US"/>
           </a:p>
@@ -869,7 +868,7 @@
           <a:p>
             <a:fld id="{9F69634C-F75C-45F7-A87A-C5E2AF3ECA41}" type="datetimeFigureOut">
               <a:rPr lang="en-US" smtClean="0"/>
-              <a:t>4/3/2024</a:t>
+              <a:t>4/4/24</a:t>
             </a:fld>
             <a:endParaRPr lang="en-US"/>
           </a:p>
@@ -1034,7 +1033,7 @@
           <a:p>
             <a:fld id="{9F69634C-F75C-45F7-A87A-C5E2AF3ECA41}" type="datetimeFigureOut">
               <a:rPr lang="en-US" smtClean="0"/>
-              <a:t>4/3/2024</a:t>
+              <a:t>4/4/24</a:t>
             </a:fld>
             <a:endParaRPr lang="en-US"/>
           </a:p>
@@ -1237,7 +1236,7 @@
           <a:p>
             <a:fld id="{9F69634C-F75C-45F7-A87A-C5E2AF3ECA41}" type="datetimeFigureOut">
               <a:rPr lang="en-US" smtClean="0"/>
-              <a:t>4/3/2024</a:t>
+              <a:t>4/4/24</a:t>
             </a:fld>
             <a:endParaRPr lang="en-US"/>
           </a:p>
@@ -1502,7 +1501,7 @@
           <a:p>
             <a:fld id="{9F69634C-F75C-45F7-A87A-C5E2AF3ECA41}" type="datetimeFigureOut">
               <a:rPr lang="en-US" smtClean="0"/>
-              <a:t>4/3/2024</a:t>
+              <a:t>4/4/24</a:t>
             </a:fld>
             <a:endParaRPr lang="en-US"/>
           </a:p>
@@ -1615,7 +1614,7 @@
           <a:p>
             <a:fld id="{9F69634C-F75C-45F7-A87A-C5E2AF3ECA41}" type="datetimeFigureOut">
               <a:rPr lang="en-US" smtClean="0"/>
-              <a:t>4/3/2024</a:t>
+              <a:t>4/4/24</a:t>
             </a:fld>
             <a:endParaRPr lang="en-US"/>
           </a:p>
@@ -1857,7 +1856,7 @@
           <a:p>
             <a:fld id="{9F69634C-F75C-45F7-A87A-C5E2AF3ECA41}" type="datetimeFigureOut">
               <a:rPr lang="en-US" smtClean="0"/>
-              <a:t>4/3/2024</a:t>
+              <a:t>4/4/24</a:t>
             </a:fld>
             <a:endParaRPr lang="en-US"/>
           </a:p>
@@ -2683,10 +2682,10 @@
       </p:sp>
       <p:sp>
         <p:nvSpPr>
-          <p:cNvPr id="3" name="Subtitle 2">
+          <p:cNvPr id="6" name="Subtitle 2">
             <a:extLst>
               <a:ext uri="{FF2B5EF4-FFF2-40B4-BE49-F238E27FC236}">
-                <a16:creationId xmlns:a16="http://schemas.microsoft.com/office/drawing/2014/main" id="{C3BC9B71-6B7C-0107-E8D4-2108C90AA159}"/>
+                <a16:creationId xmlns:a16="http://schemas.microsoft.com/office/drawing/2014/main" id="{847A6D8B-F60F-454A-2FD9-B293EFF4B60D}"/>
               </a:ext>
             </a:extLst>
           </p:cNvPr>
@@ -2697,24 +2696,30 @@
             <p:ph type="subTitle" idx="1"/>
           </p:nvPr>
         </p:nvSpPr>
-        <p:spPr/>
+        <p:spPr>
+          <a:xfrm>
+            <a:off x="1524000" y="4280132"/>
+            <a:ext cx="9144000" cy="1655762"/>
+          </a:xfrm>
+        </p:spPr>
         <p:txBody>
-          <a:bodyPr/>
+          <a:bodyPr>
+            <a:noAutofit/>
+          </a:bodyPr>
           <a:lstStyle/>
           <a:p>
             <a:r>
-              <a:rPr lang="en-US" dirty="0"/>
-              <a:t>NCSU </a:t>
+              <a:rPr lang="en-US" sz="4000" dirty="0"/>
+              <a:t>NC State </a:t>
             </a:r>
             <a:r>
-              <a:rPr lang="en-US" dirty="0" err="1"/>
+              <a:rPr lang="en-US" sz="4000" dirty="0" err="1"/>
               <a:t>scRNA</a:t>
             </a:r>
             <a:r>
-              <a:rPr lang="en-US"/>
-              <a:t>-Seq Workshop, 2024</a:t>
+              <a:rPr lang="en-US" sz="4000" dirty="0"/>
+              <a:t> Workshop, 2024</a:t>
             </a:r>
-            <a:endParaRPr lang="en-US" dirty="0"/>
           </a:p>
         </p:txBody>
       </p:sp>
@@ -3353,187 +3358,6 @@
 </file>
 
 <file path=ppt/slides/slide11.xml><?xml version="1.0" encoding="utf-8"?>
-<p:sld xmlns:a="http://schemas.openxmlformats.org/drawingml/2006/main" xmlns:r="http://schemas.openxmlformats.org/officeDocument/2006/relationships" xmlns:p="http://schemas.openxmlformats.org/presentationml/2006/main">
-  <p:cSld>
-    <p:spTree>
-      <p:nvGrpSpPr>
-        <p:cNvPr id="1" name=""/>
-        <p:cNvGrpSpPr/>
-        <p:nvPr/>
-      </p:nvGrpSpPr>
-      <p:grpSpPr>
-        <a:xfrm>
-          <a:off x="0" y="0"/>
-          <a:ext cx="0" cy="0"/>
-          <a:chOff x="0" y="0"/>
-          <a:chExt cx="0" cy="0"/>
-        </a:xfrm>
-      </p:grpSpPr>
-      <p:sp>
-        <p:nvSpPr>
-          <p:cNvPr id="2" name="Title 1">
-            <a:extLst>
-              <a:ext uri="{FF2B5EF4-FFF2-40B4-BE49-F238E27FC236}">
-                <a16:creationId xmlns:a16="http://schemas.microsoft.com/office/drawing/2014/main" id="{15FF008D-6109-C04B-2DD5-F18725394719}"/>
-              </a:ext>
-            </a:extLst>
-          </p:cNvPr>
-          <p:cNvSpPr>
-            <a:spLocks noGrp="1"/>
-          </p:cNvSpPr>
-          <p:nvPr>
-            <p:ph type="title"/>
-          </p:nvPr>
-        </p:nvSpPr>
-        <p:spPr/>
-        <p:txBody>
-          <a:bodyPr/>
-          <a:lstStyle/>
-          <a:p>
-            <a:r>
-              <a:rPr lang="en-US" dirty="0"/>
-              <a:t>Key Cell Ranger Parameters for Alignment</a:t>
-            </a:r>
-          </a:p>
-        </p:txBody>
-      </p:sp>
-      <p:sp>
-        <p:nvSpPr>
-          <p:cNvPr id="4" name="TextBox 3">
-            <a:extLst>
-              <a:ext uri="{FF2B5EF4-FFF2-40B4-BE49-F238E27FC236}">
-                <a16:creationId xmlns:a16="http://schemas.microsoft.com/office/drawing/2014/main" id="{CC1F8028-DD48-21C8-784C-0351ADD5D02F}"/>
-              </a:ext>
-            </a:extLst>
-          </p:cNvPr>
-          <p:cNvSpPr txBox="1"/>
-          <p:nvPr/>
-        </p:nvSpPr>
-        <p:spPr>
-          <a:xfrm>
-            <a:off x="4729655" y="6627168"/>
-            <a:ext cx="5155323" cy="230832"/>
-          </a:xfrm>
-          <a:prstGeom prst="rect">
-            <a:avLst/>
-          </a:prstGeom>
-          <a:noFill/>
-        </p:spPr>
-        <p:txBody>
-          <a:bodyPr wrap="square">
-            <a:spAutoFit/>
-          </a:bodyPr>
-          <a:lstStyle/>
-          <a:p>
-            <a:pPr algn="r"/>
-            <a:r>
-              <a:rPr lang="en-US" sz="900" i="1" dirty="0">
-                <a:solidFill>
-                  <a:schemeClr val="bg1">
-                    <a:lumMod val="50000"/>
-                  </a:schemeClr>
-                </a:solidFill>
-              </a:rPr>
-              <a:t>https://www.10xgenomics.com/support/software/cell-ranger/algorithms-overview/</a:t>
-            </a:r>
-            <a:r>
-              <a:rPr lang="en-US" sz="900" i="1" dirty="0" err="1">
-                <a:solidFill>
-                  <a:schemeClr val="bg1">
-                    <a:lumMod val="50000"/>
-                  </a:schemeClr>
-                </a:solidFill>
-              </a:rPr>
-              <a:t>cr</a:t>
-            </a:r>
-            <a:r>
-              <a:rPr lang="en-US" sz="900" i="1" dirty="0">
-                <a:solidFill>
-                  <a:schemeClr val="bg1">
-                    <a:lumMod val="50000"/>
-                  </a:schemeClr>
-                </a:solidFill>
-              </a:rPr>
-              <a:t>-</a:t>
-            </a:r>
-            <a:r>
-              <a:rPr lang="en-US" sz="900" i="1" dirty="0" err="1">
-                <a:solidFill>
-                  <a:schemeClr val="bg1">
-                    <a:lumMod val="50000"/>
-                  </a:schemeClr>
-                </a:solidFill>
-              </a:rPr>
-              <a:t>gex</a:t>
-            </a:r>
-            <a:r>
-              <a:rPr lang="en-US" sz="900" i="1" dirty="0">
-                <a:solidFill>
-                  <a:schemeClr val="bg1">
-                    <a:lumMod val="50000"/>
-                  </a:schemeClr>
-                </a:solidFill>
-              </a:rPr>
-              <a:t>-algorithm</a:t>
-            </a:r>
-          </a:p>
-        </p:txBody>
-      </p:sp>
-      <p:sp>
-        <p:nvSpPr>
-          <p:cNvPr id="3" name="TextBox 2">
-            <a:extLst>
-              <a:ext uri="{FF2B5EF4-FFF2-40B4-BE49-F238E27FC236}">
-                <a16:creationId xmlns:a16="http://schemas.microsoft.com/office/drawing/2014/main" id="{7915BA8D-942C-CA8B-B7AA-AAEFCEABA0B7}"/>
-              </a:ext>
-            </a:extLst>
-          </p:cNvPr>
-          <p:cNvSpPr txBox="1"/>
-          <p:nvPr/>
-        </p:nvSpPr>
-        <p:spPr>
-          <a:xfrm>
-            <a:off x="582111" y="1584672"/>
-            <a:ext cx="4910511" cy="646331"/>
-          </a:xfrm>
-          <a:prstGeom prst="rect">
-            <a:avLst/>
-          </a:prstGeom>
-          <a:noFill/>
-        </p:spPr>
-        <p:txBody>
-          <a:bodyPr wrap="none" rtlCol="0">
-            <a:spAutoFit/>
-          </a:bodyPr>
-          <a:lstStyle/>
-          <a:p>
-            <a:r>
-              <a:rPr lang="en-US" dirty="0"/>
-              <a:t>Reference Genome</a:t>
-            </a:r>
-          </a:p>
-          <a:p>
-            <a:r>
-              <a:rPr lang="en-US" dirty="0"/>
-              <a:t>  Can significantly influence number of Reads/Cells</a:t>
-            </a:r>
-          </a:p>
-        </p:txBody>
-      </p:sp>
-    </p:spTree>
-    <p:extLst>
-      <p:ext uri="{BB962C8B-B14F-4D97-AF65-F5344CB8AC3E}">
-        <p14:creationId xmlns:p14="http://schemas.microsoft.com/office/powerpoint/2010/main" val="3966724803"/>
-      </p:ext>
-    </p:extLst>
-  </p:cSld>
-  <p:clrMapOvr>
-    <a:masterClrMapping/>
-  </p:clrMapOvr>
-</p:sld>
-</file>
-
-<file path=ppt/slides/slide12.xml><?xml version="1.0" encoding="utf-8"?>
 <p:sld xmlns:a="http://schemas.openxmlformats.org/drawingml/2006/main" xmlns:r="http://schemas.openxmlformats.org/officeDocument/2006/relationships" xmlns:p="http://schemas.openxmlformats.org/presentationml/2006/main">
   <p:cSld>
     <p:spTree>

</xml_diff>